<commit_message>
add updated final project
</commit_message>
<xml_diff>
--- a/Final Project_v0.0.1.pptx
+++ b/Final Project_v0.0.1.pptx
@@ -5,7 +5,7 @@
     <p:sldMasterId id="2147483660" r:id="rId1"/>
   </p:sldMasterIdLst>
   <p:notesMasterIdLst>
-    <p:notesMasterId r:id="rId8"/>
+    <p:notesMasterId r:id="rId14"/>
   </p:notesMasterIdLst>
   <p:sldIdLst>
     <p:sldId id="256" r:id="rId2"/>
@@ -14,6 +14,12 @@
     <p:sldId id="278" r:id="rId5"/>
     <p:sldId id="284" r:id="rId6"/>
     <p:sldId id="285" r:id="rId7"/>
+    <p:sldId id="287" r:id="rId8"/>
+    <p:sldId id="289" r:id="rId9"/>
+    <p:sldId id="290" r:id="rId10"/>
+    <p:sldId id="291" r:id="rId11"/>
+    <p:sldId id="292" r:id="rId12"/>
+    <p:sldId id="293" r:id="rId13"/>
   </p:sldIdLst>
   <p:sldSz cx="9144000" cy="6858000" type="screen4x3"/>
   <p:notesSz cx="6858000" cy="9144000"/>
@@ -198,7 +204,7 @@
             <a:fld id="{7DC5F341-8573-4288-B472-152DBA7489EE}" type="datetimeFigureOut">
               <a:rPr lang="ko-KR" altLang="en-US" smtClean="0"/>
               <a:pPr/>
-              <a:t>2016-12-22</a:t>
+              <a:t>2016-12-26</a:t>
             </a:fld>
             <a:endParaRPr lang="ko-KR" altLang="en-US"/>
           </a:p>
@@ -534,6 +540,431 @@
               <a:rPr lang="ko-KR" altLang="en-US" smtClean="0"/>
               <a:pPr/>
               <a:t>6</a:t>
+            </a:fld>
+            <a:endParaRPr lang="ko-KR" altLang="en-US"/>
+          </a:p>
+        </p:txBody>
+      </p:sp>
+    </p:spTree>
+    <p:extLst>
+      <p:ext uri="{BB962C8B-B14F-4D97-AF65-F5344CB8AC3E}">
+        <p14:creationId xmlns:p14="http://schemas.microsoft.com/office/powerpoint/2010/main" val="1076318490"/>
+      </p:ext>
+    </p:extLst>
+  </p:cSld>
+  <p:clrMapOvr>
+    <a:masterClrMapping/>
+  </p:clrMapOvr>
+</p:notes>
+</file>
+
+<file path=ppt/notesSlides/notesSlide2.xml><?xml version="1.0" encoding="utf-8"?>
+<p:notes xmlns:a="http://schemas.openxmlformats.org/drawingml/2006/main" xmlns:r="http://schemas.openxmlformats.org/officeDocument/2006/relationships" xmlns:p="http://schemas.openxmlformats.org/presentationml/2006/main">
+  <p:cSld>
+    <p:spTree>
+      <p:nvGrpSpPr>
+        <p:cNvPr id="1" name=""/>
+        <p:cNvGrpSpPr/>
+        <p:nvPr/>
+      </p:nvGrpSpPr>
+      <p:grpSpPr>
+        <a:xfrm>
+          <a:off x="0" y="0"/>
+          <a:ext cx="0" cy="0"/>
+          <a:chOff x="0" y="0"/>
+          <a:chExt cx="0" cy="0"/>
+        </a:xfrm>
+      </p:grpSpPr>
+      <p:sp>
+        <p:nvSpPr>
+          <p:cNvPr id="2" name="슬라이드 이미지 개체 틀 1"/>
+          <p:cNvSpPr>
+            <a:spLocks noGrp="1" noRot="1" noChangeAspect="1"/>
+          </p:cNvSpPr>
+          <p:nvPr>
+            <p:ph type="sldImg"/>
+          </p:nvPr>
+        </p:nvSpPr>
+        <p:spPr/>
+      </p:sp>
+      <p:sp>
+        <p:nvSpPr>
+          <p:cNvPr id="3" name="슬라이드 노트 개체 틀 2"/>
+          <p:cNvSpPr>
+            <a:spLocks noGrp="1"/>
+          </p:cNvSpPr>
+          <p:nvPr>
+            <p:ph type="body" idx="1"/>
+          </p:nvPr>
+        </p:nvSpPr>
+        <p:spPr/>
+        <p:txBody>
+          <a:bodyPr/>
+          <a:lstStyle/>
+          <a:p>
+            <a:endParaRPr lang="ko-KR" altLang="en-US" dirty="0"/>
+          </a:p>
+        </p:txBody>
+      </p:sp>
+      <p:sp>
+        <p:nvSpPr>
+          <p:cNvPr id="4" name="슬라이드 번호 개체 틀 3"/>
+          <p:cNvSpPr>
+            <a:spLocks noGrp="1"/>
+          </p:cNvSpPr>
+          <p:nvPr>
+            <p:ph type="sldNum" sz="quarter" idx="10"/>
+          </p:nvPr>
+        </p:nvSpPr>
+        <p:spPr/>
+        <p:txBody>
+          <a:bodyPr/>
+          <a:lstStyle/>
+          <a:p>
+            <a:fld id="{511244DC-3C3C-480B-871A-9D3A21AEF1FA}" type="slidenum">
+              <a:rPr lang="ko-KR" altLang="en-US" smtClean="0"/>
+              <a:pPr/>
+              <a:t>7</a:t>
+            </a:fld>
+            <a:endParaRPr lang="ko-KR" altLang="en-US"/>
+          </a:p>
+        </p:txBody>
+      </p:sp>
+    </p:spTree>
+    <p:extLst>
+      <p:ext uri="{BB962C8B-B14F-4D97-AF65-F5344CB8AC3E}">
+        <p14:creationId xmlns:p14="http://schemas.microsoft.com/office/powerpoint/2010/main" val="1076318490"/>
+      </p:ext>
+    </p:extLst>
+  </p:cSld>
+  <p:clrMapOvr>
+    <a:masterClrMapping/>
+  </p:clrMapOvr>
+</p:notes>
+</file>
+
+<file path=ppt/notesSlides/notesSlide3.xml><?xml version="1.0" encoding="utf-8"?>
+<p:notes xmlns:a="http://schemas.openxmlformats.org/drawingml/2006/main" xmlns:r="http://schemas.openxmlformats.org/officeDocument/2006/relationships" xmlns:p="http://schemas.openxmlformats.org/presentationml/2006/main">
+  <p:cSld>
+    <p:spTree>
+      <p:nvGrpSpPr>
+        <p:cNvPr id="1" name=""/>
+        <p:cNvGrpSpPr/>
+        <p:nvPr/>
+      </p:nvGrpSpPr>
+      <p:grpSpPr>
+        <a:xfrm>
+          <a:off x="0" y="0"/>
+          <a:ext cx="0" cy="0"/>
+          <a:chOff x="0" y="0"/>
+          <a:chExt cx="0" cy="0"/>
+        </a:xfrm>
+      </p:grpSpPr>
+      <p:sp>
+        <p:nvSpPr>
+          <p:cNvPr id="2" name="슬라이드 이미지 개체 틀 1"/>
+          <p:cNvSpPr>
+            <a:spLocks noGrp="1" noRot="1" noChangeAspect="1"/>
+          </p:cNvSpPr>
+          <p:nvPr>
+            <p:ph type="sldImg"/>
+          </p:nvPr>
+        </p:nvSpPr>
+        <p:spPr/>
+      </p:sp>
+      <p:sp>
+        <p:nvSpPr>
+          <p:cNvPr id="3" name="슬라이드 노트 개체 틀 2"/>
+          <p:cNvSpPr>
+            <a:spLocks noGrp="1"/>
+          </p:cNvSpPr>
+          <p:nvPr>
+            <p:ph type="body" idx="1"/>
+          </p:nvPr>
+        </p:nvSpPr>
+        <p:spPr/>
+        <p:txBody>
+          <a:bodyPr/>
+          <a:lstStyle/>
+          <a:p>
+            <a:endParaRPr lang="ko-KR" altLang="en-US" dirty="0"/>
+          </a:p>
+        </p:txBody>
+      </p:sp>
+      <p:sp>
+        <p:nvSpPr>
+          <p:cNvPr id="4" name="슬라이드 번호 개체 틀 3"/>
+          <p:cNvSpPr>
+            <a:spLocks noGrp="1"/>
+          </p:cNvSpPr>
+          <p:nvPr>
+            <p:ph type="sldNum" sz="quarter" idx="10"/>
+          </p:nvPr>
+        </p:nvSpPr>
+        <p:spPr/>
+        <p:txBody>
+          <a:bodyPr/>
+          <a:lstStyle/>
+          <a:p>
+            <a:fld id="{511244DC-3C3C-480B-871A-9D3A21AEF1FA}" type="slidenum">
+              <a:rPr lang="ko-KR" altLang="en-US" smtClean="0"/>
+              <a:pPr/>
+              <a:t>8</a:t>
+            </a:fld>
+            <a:endParaRPr lang="ko-KR" altLang="en-US"/>
+          </a:p>
+        </p:txBody>
+      </p:sp>
+    </p:spTree>
+    <p:extLst>
+      <p:ext uri="{BB962C8B-B14F-4D97-AF65-F5344CB8AC3E}">
+        <p14:creationId xmlns:p14="http://schemas.microsoft.com/office/powerpoint/2010/main" val="1076318490"/>
+      </p:ext>
+    </p:extLst>
+  </p:cSld>
+  <p:clrMapOvr>
+    <a:masterClrMapping/>
+  </p:clrMapOvr>
+</p:notes>
+</file>
+
+<file path=ppt/notesSlides/notesSlide4.xml><?xml version="1.0" encoding="utf-8"?>
+<p:notes xmlns:a="http://schemas.openxmlformats.org/drawingml/2006/main" xmlns:r="http://schemas.openxmlformats.org/officeDocument/2006/relationships" xmlns:p="http://schemas.openxmlformats.org/presentationml/2006/main">
+  <p:cSld>
+    <p:spTree>
+      <p:nvGrpSpPr>
+        <p:cNvPr id="1" name=""/>
+        <p:cNvGrpSpPr/>
+        <p:nvPr/>
+      </p:nvGrpSpPr>
+      <p:grpSpPr>
+        <a:xfrm>
+          <a:off x="0" y="0"/>
+          <a:ext cx="0" cy="0"/>
+          <a:chOff x="0" y="0"/>
+          <a:chExt cx="0" cy="0"/>
+        </a:xfrm>
+      </p:grpSpPr>
+      <p:sp>
+        <p:nvSpPr>
+          <p:cNvPr id="2" name="슬라이드 이미지 개체 틀 1"/>
+          <p:cNvSpPr>
+            <a:spLocks noGrp="1" noRot="1" noChangeAspect="1"/>
+          </p:cNvSpPr>
+          <p:nvPr>
+            <p:ph type="sldImg"/>
+          </p:nvPr>
+        </p:nvSpPr>
+        <p:spPr/>
+      </p:sp>
+      <p:sp>
+        <p:nvSpPr>
+          <p:cNvPr id="3" name="슬라이드 노트 개체 틀 2"/>
+          <p:cNvSpPr>
+            <a:spLocks noGrp="1"/>
+          </p:cNvSpPr>
+          <p:nvPr>
+            <p:ph type="body" idx="1"/>
+          </p:nvPr>
+        </p:nvSpPr>
+        <p:spPr/>
+        <p:txBody>
+          <a:bodyPr/>
+          <a:lstStyle/>
+          <a:p>
+            <a:endParaRPr lang="ko-KR" altLang="en-US" dirty="0"/>
+          </a:p>
+        </p:txBody>
+      </p:sp>
+      <p:sp>
+        <p:nvSpPr>
+          <p:cNvPr id="4" name="슬라이드 번호 개체 틀 3"/>
+          <p:cNvSpPr>
+            <a:spLocks noGrp="1"/>
+          </p:cNvSpPr>
+          <p:nvPr>
+            <p:ph type="sldNum" sz="quarter" idx="10"/>
+          </p:nvPr>
+        </p:nvSpPr>
+        <p:spPr/>
+        <p:txBody>
+          <a:bodyPr/>
+          <a:lstStyle/>
+          <a:p>
+            <a:fld id="{511244DC-3C3C-480B-871A-9D3A21AEF1FA}" type="slidenum">
+              <a:rPr lang="ko-KR" altLang="en-US" smtClean="0"/>
+              <a:pPr/>
+              <a:t>9</a:t>
+            </a:fld>
+            <a:endParaRPr lang="ko-KR" altLang="en-US"/>
+          </a:p>
+        </p:txBody>
+      </p:sp>
+    </p:spTree>
+    <p:extLst>
+      <p:ext uri="{BB962C8B-B14F-4D97-AF65-F5344CB8AC3E}">
+        <p14:creationId xmlns:p14="http://schemas.microsoft.com/office/powerpoint/2010/main" val="1076318490"/>
+      </p:ext>
+    </p:extLst>
+  </p:cSld>
+  <p:clrMapOvr>
+    <a:masterClrMapping/>
+  </p:clrMapOvr>
+</p:notes>
+</file>
+
+<file path=ppt/notesSlides/notesSlide5.xml><?xml version="1.0" encoding="utf-8"?>
+<p:notes xmlns:a="http://schemas.openxmlformats.org/drawingml/2006/main" xmlns:r="http://schemas.openxmlformats.org/officeDocument/2006/relationships" xmlns:p="http://schemas.openxmlformats.org/presentationml/2006/main">
+  <p:cSld>
+    <p:spTree>
+      <p:nvGrpSpPr>
+        <p:cNvPr id="1" name=""/>
+        <p:cNvGrpSpPr/>
+        <p:nvPr/>
+      </p:nvGrpSpPr>
+      <p:grpSpPr>
+        <a:xfrm>
+          <a:off x="0" y="0"/>
+          <a:ext cx="0" cy="0"/>
+          <a:chOff x="0" y="0"/>
+          <a:chExt cx="0" cy="0"/>
+        </a:xfrm>
+      </p:grpSpPr>
+      <p:sp>
+        <p:nvSpPr>
+          <p:cNvPr id="2" name="슬라이드 이미지 개체 틀 1"/>
+          <p:cNvSpPr>
+            <a:spLocks noGrp="1" noRot="1" noChangeAspect="1"/>
+          </p:cNvSpPr>
+          <p:nvPr>
+            <p:ph type="sldImg"/>
+          </p:nvPr>
+        </p:nvSpPr>
+        <p:spPr/>
+      </p:sp>
+      <p:sp>
+        <p:nvSpPr>
+          <p:cNvPr id="3" name="슬라이드 노트 개체 틀 2"/>
+          <p:cNvSpPr>
+            <a:spLocks noGrp="1"/>
+          </p:cNvSpPr>
+          <p:nvPr>
+            <p:ph type="body" idx="1"/>
+          </p:nvPr>
+        </p:nvSpPr>
+        <p:spPr/>
+        <p:txBody>
+          <a:bodyPr/>
+          <a:lstStyle/>
+          <a:p>
+            <a:endParaRPr lang="ko-KR" altLang="en-US" dirty="0"/>
+          </a:p>
+        </p:txBody>
+      </p:sp>
+      <p:sp>
+        <p:nvSpPr>
+          <p:cNvPr id="4" name="슬라이드 번호 개체 틀 3"/>
+          <p:cNvSpPr>
+            <a:spLocks noGrp="1"/>
+          </p:cNvSpPr>
+          <p:nvPr>
+            <p:ph type="sldNum" sz="quarter" idx="10"/>
+          </p:nvPr>
+        </p:nvSpPr>
+        <p:spPr/>
+        <p:txBody>
+          <a:bodyPr/>
+          <a:lstStyle/>
+          <a:p>
+            <a:fld id="{511244DC-3C3C-480B-871A-9D3A21AEF1FA}" type="slidenum">
+              <a:rPr lang="ko-KR" altLang="en-US" smtClean="0"/>
+              <a:pPr/>
+              <a:t>10</a:t>
+            </a:fld>
+            <a:endParaRPr lang="ko-KR" altLang="en-US"/>
+          </a:p>
+        </p:txBody>
+      </p:sp>
+    </p:spTree>
+    <p:extLst>
+      <p:ext uri="{BB962C8B-B14F-4D97-AF65-F5344CB8AC3E}">
+        <p14:creationId xmlns:p14="http://schemas.microsoft.com/office/powerpoint/2010/main" val="1076318490"/>
+      </p:ext>
+    </p:extLst>
+  </p:cSld>
+  <p:clrMapOvr>
+    <a:masterClrMapping/>
+  </p:clrMapOvr>
+</p:notes>
+</file>
+
+<file path=ppt/notesSlides/notesSlide6.xml><?xml version="1.0" encoding="utf-8"?>
+<p:notes xmlns:a="http://schemas.openxmlformats.org/drawingml/2006/main" xmlns:r="http://schemas.openxmlformats.org/officeDocument/2006/relationships" xmlns:p="http://schemas.openxmlformats.org/presentationml/2006/main">
+  <p:cSld>
+    <p:spTree>
+      <p:nvGrpSpPr>
+        <p:cNvPr id="1" name=""/>
+        <p:cNvGrpSpPr/>
+        <p:nvPr/>
+      </p:nvGrpSpPr>
+      <p:grpSpPr>
+        <a:xfrm>
+          <a:off x="0" y="0"/>
+          <a:ext cx="0" cy="0"/>
+          <a:chOff x="0" y="0"/>
+          <a:chExt cx="0" cy="0"/>
+        </a:xfrm>
+      </p:grpSpPr>
+      <p:sp>
+        <p:nvSpPr>
+          <p:cNvPr id="2" name="슬라이드 이미지 개체 틀 1"/>
+          <p:cNvSpPr>
+            <a:spLocks noGrp="1" noRot="1" noChangeAspect="1"/>
+          </p:cNvSpPr>
+          <p:nvPr>
+            <p:ph type="sldImg"/>
+          </p:nvPr>
+        </p:nvSpPr>
+        <p:spPr/>
+      </p:sp>
+      <p:sp>
+        <p:nvSpPr>
+          <p:cNvPr id="3" name="슬라이드 노트 개체 틀 2"/>
+          <p:cNvSpPr>
+            <a:spLocks noGrp="1"/>
+          </p:cNvSpPr>
+          <p:nvPr>
+            <p:ph type="body" idx="1"/>
+          </p:nvPr>
+        </p:nvSpPr>
+        <p:spPr/>
+        <p:txBody>
+          <a:bodyPr/>
+          <a:lstStyle/>
+          <a:p>
+            <a:endParaRPr lang="ko-KR" altLang="en-US" dirty="0"/>
+          </a:p>
+        </p:txBody>
+      </p:sp>
+      <p:sp>
+        <p:nvSpPr>
+          <p:cNvPr id="4" name="슬라이드 번호 개체 틀 3"/>
+          <p:cNvSpPr>
+            <a:spLocks noGrp="1"/>
+          </p:cNvSpPr>
+          <p:nvPr>
+            <p:ph type="sldNum" sz="quarter" idx="10"/>
+          </p:nvPr>
+        </p:nvSpPr>
+        <p:spPr/>
+        <p:txBody>
+          <a:bodyPr/>
+          <a:lstStyle/>
+          <a:p>
+            <a:fld id="{511244DC-3C3C-480B-871A-9D3A21AEF1FA}" type="slidenum">
+              <a:rPr lang="ko-KR" altLang="en-US" smtClean="0"/>
+              <a:pPr/>
+              <a:t>11</a:t>
             </a:fld>
             <a:endParaRPr lang="ko-KR" altLang="en-US"/>
           </a:p>
@@ -2481,7 +2912,7 @@
             <a:fld id="{8F7D61AA-29A0-4C37-B234-B0D2D19F94CD}" type="datetimeFigureOut">
               <a:rPr lang="ko-KR" altLang="en-US" smtClean="0"/>
               <a:pPr/>
-              <a:t>2016-12-22</a:t>
+              <a:t>2016-12-26</a:t>
             </a:fld>
             <a:endParaRPr lang="ko-KR" altLang="en-US"/>
           </a:p>
@@ -3072,6 +3503,671 @@
 </p:sld>
 </file>
 
+<file path=ppt/slides/slide10.xml><?xml version="1.0" encoding="utf-8"?>
+<p:sld xmlns:a="http://schemas.openxmlformats.org/drawingml/2006/main" xmlns:r="http://schemas.openxmlformats.org/officeDocument/2006/relationships" xmlns:p="http://schemas.openxmlformats.org/presentationml/2006/main">
+  <p:cSld>
+    <p:spTree>
+      <p:nvGrpSpPr>
+        <p:cNvPr id="1" name=""/>
+        <p:cNvGrpSpPr/>
+        <p:nvPr/>
+      </p:nvGrpSpPr>
+      <p:grpSpPr>
+        <a:xfrm>
+          <a:off x="0" y="0"/>
+          <a:ext cx="0" cy="0"/>
+          <a:chOff x="0" y="0"/>
+          <a:chExt cx="0" cy="0"/>
+        </a:xfrm>
+      </p:grpSpPr>
+      <p:sp>
+        <p:nvSpPr>
+          <p:cNvPr id="2" name="텍스트 개체 틀 1"/>
+          <p:cNvSpPr>
+            <a:spLocks noGrp="1"/>
+          </p:cNvSpPr>
+          <p:nvPr>
+            <p:ph type="body" sz="quarter" idx="10"/>
+          </p:nvPr>
+        </p:nvSpPr>
+        <p:spPr/>
+        <p:txBody>
+          <a:bodyPr/>
+          <a:lstStyle/>
+          <a:p>
+            <a:pPr>
+              <a:buFont typeface="+mj-lt"/>
+              <a:buAutoNum type="arabicPeriod" startAt="3"/>
+            </a:pPr>
+            <a:r>
+              <a:rPr lang="en-US" altLang="ko-KR" dirty="0" smtClean="0"/>
+              <a:t>DB </a:t>
+            </a:r>
+            <a:r>
+              <a:rPr lang="ko-KR" altLang="en-US" dirty="0" smtClean="0"/>
+              <a:t>구성 </a:t>
+            </a:r>
+            <a:r>
+              <a:rPr lang="en-US" altLang="ko-KR" dirty="0" smtClean="0"/>
+              <a:t>- </a:t>
+            </a:r>
+            <a:r>
+              <a:rPr lang="en-US" altLang="ko-KR" dirty="0"/>
+              <a:t>EXPENSES</a:t>
+            </a:r>
+            <a:endParaRPr lang="ko-KR" altLang="en-US" dirty="0"/>
+          </a:p>
+        </p:txBody>
+      </p:sp>
+      <p:sp>
+        <p:nvSpPr>
+          <p:cNvPr id="17" name="직사각형 16"/>
+          <p:cNvSpPr/>
+          <p:nvPr/>
+        </p:nvSpPr>
+        <p:spPr>
+          <a:xfrm>
+            <a:off x="251520" y="980728"/>
+            <a:ext cx="4572000" cy="2954655"/>
+          </a:xfrm>
+          <a:prstGeom prst="rect">
+            <a:avLst/>
+          </a:prstGeom>
+        </p:spPr>
+        <p:txBody>
+          <a:bodyPr>
+            <a:spAutoFit/>
+          </a:bodyPr>
+          <a:lstStyle/>
+          <a:p>
+            <a:pPr marL="171450" indent="-171450">
+              <a:buFont typeface="Arial" pitchFamily="34" charset="0"/>
+              <a:buChar char="•"/>
+            </a:pPr>
+            <a:r>
+              <a:rPr lang="ko-KR" altLang="en-US" sz="1400" b="1" dirty="0" smtClean="0"/>
+              <a:t>지출관리</a:t>
+            </a:r>
+            <a:endParaRPr lang="en-US" altLang="ko-KR" sz="1400" b="1" dirty="0" smtClean="0"/>
+          </a:p>
+          <a:p>
+            <a:endParaRPr lang="en-US" altLang="ko-KR" sz="1400" b="1" dirty="0"/>
+          </a:p>
+          <a:p>
+            <a:pPr lvl="1"/>
+            <a:r>
+              <a:rPr lang="en-US" altLang="ko-KR" sz="1400" dirty="0"/>
+              <a:t>CREATE TABLE EXPENSES</a:t>
+            </a:r>
+          </a:p>
+          <a:p>
+            <a:pPr lvl="1"/>
+            <a:r>
+              <a:rPr lang="en-US" altLang="ko-KR" sz="1400" dirty="0"/>
+              <a:t>(</a:t>
+            </a:r>
+          </a:p>
+          <a:p>
+            <a:pPr lvl="1"/>
+            <a:r>
+              <a:rPr lang="en-US" altLang="ko-KR" sz="1400" dirty="0"/>
+              <a:t>EXP_SQ NUMBER,</a:t>
+            </a:r>
+          </a:p>
+          <a:p>
+            <a:pPr lvl="1"/>
+            <a:r>
+              <a:rPr lang="en-US" altLang="ko-KR" sz="1400" dirty="0"/>
+              <a:t>USER_NO NUMBER,</a:t>
+            </a:r>
+          </a:p>
+          <a:p>
+            <a:pPr lvl="1"/>
+            <a:r>
+              <a:rPr lang="en-US" altLang="ko-KR" sz="1400" dirty="0"/>
+              <a:t>AMOUNTS NUMBER,</a:t>
+            </a:r>
+          </a:p>
+          <a:p>
+            <a:pPr lvl="1"/>
+            <a:r>
+              <a:rPr lang="en-US" altLang="ko-KR" sz="1400" dirty="0"/>
+              <a:t>MEMO VARCHAR2(50),</a:t>
+            </a:r>
+          </a:p>
+          <a:p>
+            <a:pPr lvl="1"/>
+            <a:r>
+              <a:rPr lang="en-US" altLang="ko-KR" sz="1400" dirty="0"/>
+              <a:t>EXP_DATE DATE,</a:t>
+            </a:r>
+          </a:p>
+          <a:p>
+            <a:pPr lvl="1"/>
+            <a:r>
+              <a:rPr lang="en-US" altLang="ko-KR" sz="1400" dirty="0"/>
+              <a:t>ACCOUNTNO NUMBER,</a:t>
+            </a:r>
+          </a:p>
+          <a:p>
+            <a:pPr lvl="1"/>
+            <a:r>
+              <a:rPr lang="en-US" altLang="ko-KR" sz="1400" dirty="0"/>
+              <a:t>CATEGORYNO NUMBER,</a:t>
+            </a:r>
+          </a:p>
+          <a:p>
+            <a:pPr lvl="1"/>
+            <a:r>
+              <a:rPr lang="en-US" altLang="ko-KR" sz="1400" dirty="0"/>
+              <a:t>PRIMARY KEY(EXP_SQ)</a:t>
+            </a:r>
+          </a:p>
+          <a:p>
+            <a:pPr lvl="1"/>
+            <a:r>
+              <a:rPr lang="en-US" altLang="ko-KR" sz="1400" dirty="0"/>
+              <a:t>)</a:t>
+            </a:r>
+            <a:endParaRPr lang="ko-KR" altLang="en-US" sz="1400" dirty="0"/>
+          </a:p>
+        </p:txBody>
+      </p:sp>
+      <p:sp>
+        <p:nvSpPr>
+          <p:cNvPr id="9" name="직사각형 8"/>
+          <p:cNvSpPr/>
+          <p:nvPr/>
+        </p:nvSpPr>
+        <p:spPr>
+          <a:xfrm>
+            <a:off x="4572000" y="980728"/>
+            <a:ext cx="4572000" cy="4739759"/>
+          </a:xfrm>
+          <a:prstGeom prst="rect">
+            <a:avLst/>
+          </a:prstGeom>
+        </p:spPr>
+        <p:txBody>
+          <a:bodyPr>
+            <a:spAutoFit/>
+          </a:bodyPr>
+          <a:lstStyle/>
+          <a:p>
+            <a:pPr marL="285750" indent="-285750">
+              <a:buFont typeface="Arial" pitchFamily="34" charset="0"/>
+              <a:buChar char="•"/>
+            </a:pPr>
+            <a:r>
+              <a:rPr lang="ko-KR" altLang="en-US" sz="1400" b="1" dirty="0"/>
+              <a:t>제약조건 추가</a:t>
+            </a:r>
+            <a:endParaRPr lang="en-US" altLang="ko-KR" sz="1400" b="1" dirty="0"/>
+          </a:p>
+          <a:p>
+            <a:endParaRPr lang="en-US" altLang="ko-KR" sz="1400" dirty="0"/>
+          </a:p>
+          <a:p>
+            <a:pPr lvl="1"/>
+            <a:r>
+              <a:rPr lang="en-US" altLang="ko-KR" sz="1400" dirty="0"/>
+              <a:t>ALTER TABLE EXPENSES</a:t>
+            </a:r>
+          </a:p>
+          <a:p>
+            <a:pPr lvl="1"/>
+            <a:r>
+              <a:rPr lang="en-US" altLang="ko-KR" sz="1400" dirty="0"/>
+              <a:t>ADD</a:t>
+            </a:r>
+          </a:p>
+          <a:p>
+            <a:pPr lvl="1"/>
+            <a:r>
+              <a:rPr lang="en-US" altLang="ko-KR" sz="1400" dirty="0"/>
+              <a:t>CONSTRAINT USRNO_EXP_FK FOREIGN KEY(USER_NO) REFERENCES REGISTER(USER_NO)</a:t>
+            </a:r>
+          </a:p>
+          <a:p>
+            <a:pPr lvl="1"/>
+            <a:endParaRPr lang="en-US" altLang="ko-KR" sz="1400" dirty="0"/>
+          </a:p>
+          <a:p>
+            <a:pPr lvl="1"/>
+            <a:r>
+              <a:rPr lang="en-US" altLang="ko-KR" sz="1400" dirty="0"/>
+              <a:t>ALTER TABLE EXPENSES</a:t>
+            </a:r>
+          </a:p>
+          <a:p>
+            <a:pPr lvl="1"/>
+            <a:r>
+              <a:rPr lang="en-US" altLang="ko-KR" sz="1400" dirty="0"/>
+              <a:t>ADD</a:t>
+            </a:r>
+          </a:p>
+          <a:p>
+            <a:pPr lvl="1"/>
+            <a:r>
+              <a:rPr lang="en-US" altLang="ko-KR" sz="1400" dirty="0"/>
+              <a:t>CONSTRAINT ACTNO_EXP_FK FOREIGN KEY(ACCOUNTNO) REFERENCES ACCOUNTMGR(ACCOUNTNO)</a:t>
+            </a:r>
+          </a:p>
+          <a:p>
+            <a:pPr lvl="1"/>
+            <a:endParaRPr lang="en-US" altLang="ko-KR" sz="1400" dirty="0"/>
+          </a:p>
+          <a:p>
+            <a:pPr lvl="1"/>
+            <a:r>
+              <a:rPr lang="en-US" altLang="ko-KR" sz="1400" dirty="0"/>
+              <a:t>ALTER TABLE EXPENSES</a:t>
+            </a:r>
+          </a:p>
+          <a:p>
+            <a:pPr lvl="1"/>
+            <a:r>
+              <a:rPr lang="en-US" altLang="ko-KR" sz="1400" dirty="0"/>
+              <a:t>ADD</a:t>
+            </a:r>
+          </a:p>
+          <a:p>
+            <a:pPr lvl="1"/>
+            <a:r>
+              <a:rPr lang="en-US" altLang="ko-KR" sz="1400" dirty="0"/>
+              <a:t>CONSTRAINT CATNO_EXP_FK FOREIGN KEY(CATEGORYNO) REFERENCES CATEGORYMGR(CATEGORYNO)</a:t>
+            </a:r>
+          </a:p>
+          <a:p>
+            <a:pPr lvl="1"/>
+            <a:endParaRPr lang="en-US" altLang="ko-KR" sz="1400" dirty="0"/>
+          </a:p>
+          <a:p>
+            <a:pPr lvl="1"/>
+            <a:endParaRPr lang="en-US" altLang="ko-KR" dirty="0"/>
+          </a:p>
+          <a:p>
+            <a:pPr lvl="1"/>
+            <a:endParaRPr lang="en-US" altLang="ko-KR" dirty="0"/>
+          </a:p>
+        </p:txBody>
+      </p:sp>
+    </p:spTree>
+    <p:extLst>
+      <p:ext uri="{BB962C8B-B14F-4D97-AF65-F5344CB8AC3E}">
+        <p14:creationId xmlns:p14="http://schemas.microsoft.com/office/powerpoint/2010/main" val="3474149023"/>
+      </p:ext>
+    </p:extLst>
+  </p:cSld>
+  <p:clrMapOvr>
+    <a:masterClrMapping/>
+  </p:clrMapOvr>
+</p:sld>
+</file>
+
+<file path=ppt/slides/slide11.xml><?xml version="1.0" encoding="utf-8"?>
+<p:sld xmlns:a="http://schemas.openxmlformats.org/drawingml/2006/main" xmlns:r="http://schemas.openxmlformats.org/officeDocument/2006/relationships" xmlns:p="http://schemas.openxmlformats.org/presentationml/2006/main">
+  <p:cSld>
+    <p:spTree>
+      <p:nvGrpSpPr>
+        <p:cNvPr id="1" name=""/>
+        <p:cNvGrpSpPr/>
+        <p:nvPr/>
+      </p:nvGrpSpPr>
+      <p:grpSpPr>
+        <a:xfrm>
+          <a:off x="0" y="0"/>
+          <a:ext cx="0" cy="0"/>
+          <a:chOff x="0" y="0"/>
+          <a:chExt cx="0" cy="0"/>
+        </a:xfrm>
+      </p:grpSpPr>
+      <p:sp>
+        <p:nvSpPr>
+          <p:cNvPr id="2" name="텍스트 개체 틀 1"/>
+          <p:cNvSpPr>
+            <a:spLocks noGrp="1"/>
+          </p:cNvSpPr>
+          <p:nvPr>
+            <p:ph type="body" sz="quarter" idx="10"/>
+          </p:nvPr>
+        </p:nvSpPr>
+        <p:spPr/>
+        <p:txBody>
+          <a:bodyPr/>
+          <a:lstStyle/>
+          <a:p>
+            <a:pPr>
+              <a:buFont typeface="+mj-lt"/>
+              <a:buAutoNum type="arabicPeriod" startAt="3"/>
+            </a:pPr>
+            <a:r>
+              <a:rPr lang="en-US" altLang="ko-KR" dirty="0" smtClean="0"/>
+              <a:t>DB </a:t>
+            </a:r>
+            <a:r>
+              <a:rPr lang="ko-KR" altLang="en-US" dirty="0" smtClean="0"/>
+              <a:t>구성 </a:t>
+            </a:r>
+            <a:r>
+              <a:rPr lang="en-US" altLang="ko-KR" dirty="0" smtClean="0"/>
+              <a:t>- </a:t>
+            </a:r>
+            <a:r>
+              <a:rPr lang="en-US" altLang="ko-KR" dirty="0"/>
+              <a:t>CATEGORYMGR</a:t>
+            </a:r>
+            <a:endParaRPr lang="ko-KR" altLang="en-US" dirty="0"/>
+          </a:p>
+        </p:txBody>
+      </p:sp>
+      <p:sp>
+        <p:nvSpPr>
+          <p:cNvPr id="18" name="직사각형 17"/>
+          <p:cNvSpPr/>
+          <p:nvPr/>
+        </p:nvSpPr>
+        <p:spPr>
+          <a:xfrm>
+            <a:off x="251520" y="980728"/>
+            <a:ext cx="4572000" cy="2677656"/>
+          </a:xfrm>
+          <a:prstGeom prst="rect">
+            <a:avLst/>
+          </a:prstGeom>
+        </p:spPr>
+        <p:txBody>
+          <a:bodyPr>
+            <a:spAutoFit/>
+          </a:bodyPr>
+          <a:lstStyle/>
+          <a:p>
+            <a:pPr marL="285750" indent="-285750">
+              <a:buFont typeface="Arial" pitchFamily="34" charset="0"/>
+              <a:buChar char="•"/>
+            </a:pPr>
+            <a:r>
+              <a:rPr lang="ko-KR" altLang="en-US" sz="1400" b="1" dirty="0" smtClean="0"/>
+              <a:t>카테고리 관리</a:t>
+            </a:r>
+            <a:endParaRPr lang="en-US" altLang="ko-KR" sz="1400" b="1" dirty="0" smtClean="0"/>
+          </a:p>
+          <a:p>
+            <a:pPr marL="742950" lvl="1" indent="-285750">
+              <a:buFont typeface="Arial" pitchFamily="34" charset="0"/>
+              <a:buChar char="•"/>
+            </a:pPr>
+            <a:endParaRPr lang="en-US" altLang="ko-KR" sz="1400" dirty="0" smtClean="0"/>
+          </a:p>
+          <a:p>
+            <a:pPr lvl="1"/>
+            <a:r>
+              <a:rPr lang="en-US" altLang="ko-KR" sz="1400" dirty="0" smtClean="0"/>
+              <a:t>CREATE </a:t>
+            </a:r>
+            <a:r>
+              <a:rPr lang="en-US" altLang="ko-KR" sz="1400" dirty="0"/>
+              <a:t>TABLE CATEGORYMGR</a:t>
+            </a:r>
+          </a:p>
+          <a:p>
+            <a:pPr lvl="1"/>
+            <a:r>
+              <a:rPr lang="en-US" altLang="ko-KR" sz="1400" dirty="0"/>
+              <a:t>(</a:t>
+            </a:r>
+          </a:p>
+          <a:p>
+            <a:pPr lvl="1"/>
+            <a:r>
+              <a:rPr lang="en-US" altLang="ko-KR" sz="1400" dirty="0"/>
+              <a:t>CATEGORYNO VARCHAR2(15),</a:t>
+            </a:r>
+          </a:p>
+          <a:p>
+            <a:pPr lvl="1"/>
+            <a:r>
+              <a:rPr lang="en-US" altLang="ko-KR" sz="1400" dirty="0"/>
+              <a:t>CATEGORY VARCHAR2(20),</a:t>
+            </a:r>
+          </a:p>
+          <a:p>
+            <a:pPr lvl="1"/>
+            <a:r>
+              <a:rPr lang="en-US" altLang="ko-KR" sz="1400" dirty="0"/>
+              <a:t>CATTYPE VARCHAR2(20),</a:t>
+            </a:r>
+          </a:p>
+          <a:p>
+            <a:pPr lvl="1"/>
+            <a:r>
+              <a:rPr lang="en-US" altLang="ko-KR" sz="1400" dirty="0"/>
+              <a:t>BUDGET NUMBER,</a:t>
+            </a:r>
+          </a:p>
+          <a:p>
+            <a:pPr lvl="1"/>
+            <a:r>
+              <a:rPr lang="en-US" altLang="ko-KR" sz="1400" dirty="0"/>
+              <a:t>BALANCE NUMBER,</a:t>
+            </a:r>
+          </a:p>
+          <a:p>
+            <a:pPr lvl="1"/>
+            <a:r>
+              <a:rPr lang="en-US" altLang="ko-KR" sz="1400" dirty="0"/>
+              <a:t>USER_NO NUMBER,</a:t>
+            </a:r>
+          </a:p>
+          <a:p>
+            <a:pPr lvl="1"/>
+            <a:r>
+              <a:rPr lang="en-US" altLang="ko-KR" sz="1400" dirty="0"/>
+              <a:t>PRIMARY KEY(CATEGORYNO)</a:t>
+            </a:r>
+          </a:p>
+          <a:p>
+            <a:pPr lvl="1"/>
+            <a:r>
+              <a:rPr lang="en-US" altLang="ko-KR" sz="1400" dirty="0"/>
+              <a:t>)</a:t>
+            </a:r>
+            <a:endParaRPr lang="ko-KR" altLang="en-US" sz="1400" dirty="0"/>
+          </a:p>
+        </p:txBody>
+      </p:sp>
+      <p:sp>
+        <p:nvSpPr>
+          <p:cNvPr id="10" name="직사각형 9"/>
+          <p:cNvSpPr/>
+          <p:nvPr/>
+        </p:nvSpPr>
+        <p:spPr>
+          <a:xfrm>
+            <a:off x="4572000" y="980728"/>
+            <a:ext cx="4572000" cy="2893100"/>
+          </a:xfrm>
+          <a:prstGeom prst="rect">
+            <a:avLst/>
+          </a:prstGeom>
+        </p:spPr>
+        <p:txBody>
+          <a:bodyPr>
+            <a:spAutoFit/>
+          </a:bodyPr>
+          <a:lstStyle/>
+          <a:p>
+            <a:pPr marL="285750" indent="-285750">
+              <a:buFont typeface="Arial" pitchFamily="34" charset="0"/>
+              <a:buChar char="•"/>
+            </a:pPr>
+            <a:r>
+              <a:rPr lang="ko-KR" altLang="en-US" sz="1400" b="1" dirty="0"/>
+              <a:t>제약조건 추가</a:t>
+            </a:r>
+            <a:endParaRPr lang="en-US" altLang="ko-KR" sz="1400" b="1" dirty="0"/>
+          </a:p>
+          <a:p>
+            <a:endParaRPr lang="en-US" altLang="ko-KR" sz="1400" dirty="0"/>
+          </a:p>
+          <a:p>
+            <a:pPr lvl="1"/>
+            <a:r>
+              <a:rPr lang="en-US" altLang="ko-KR" sz="1400" dirty="0" smtClean="0"/>
+              <a:t>ALTER </a:t>
+            </a:r>
+            <a:r>
+              <a:rPr lang="en-US" altLang="ko-KR" sz="1400" dirty="0"/>
+              <a:t>TABLE CATEGORYMGR</a:t>
+            </a:r>
+          </a:p>
+          <a:p>
+            <a:pPr lvl="1"/>
+            <a:r>
+              <a:rPr lang="en-US" altLang="ko-KR" sz="1400" dirty="0"/>
+              <a:t>ADD</a:t>
+            </a:r>
+          </a:p>
+          <a:p>
+            <a:pPr lvl="1"/>
+            <a:r>
+              <a:rPr lang="en-US" altLang="ko-KR" sz="1400" dirty="0"/>
+              <a:t>CONSTRAINT </a:t>
+            </a:r>
+            <a:r>
+              <a:rPr lang="en-US" altLang="ko-KR" sz="1400" dirty="0" smtClean="0"/>
+              <a:t>USRNO_CAT_FK </a:t>
+            </a:r>
+            <a:r>
+              <a:rPr lang="en-US" altLang="ko-KR" sz="1400" dirty="0"/>
+              <a:t>FOREIGN </a:t>
+            </a:r>
+            <a:r>
+              <a:rPr lang="en-US" altLang="ko-KR" sz="1400" dirty="0" smtClean="0"/>
+              <a:t>KEY(</a:t>
+            </a:r>
+            <a:r>
+              <a:rPr lang="en-US" altLang="ko-KR" sz="1400" dirty="0"/>
+              <a:t>USER_NO</a:t>
+            </a:r>
+            <a:r>
+              <a:rPr lang="en-US" altLang="ko-KR" sz="1400" dirty="0" smtClean="0"/>
+              <a:t>) </a:t>
+            </a:r>
+            <a:r>
+              <a:rPr lang="en-US" altLang="ko-KR" sz="1400" dirty="0"/>
+              <a:t>REFERENCES </a:t>
+            </a:r>
+            <a:r>
+              <a:rPr lang="en-US" altLang="ko-KR" sz="1400" dirty="0" smtClean="0"/>
+              <a:t>REGISTER(</a:t>
+            </a:r>
+            <a:r>
+              <a:rPr lang="en-US" altLang="ko-KR" sz="1400" dirty="0"/>
+              <a:t>USER_NO</a:t>
+            </a:r>
+            <a:r>
+              <a:rPr lang="en-US" altLang="ko-KR" sz="1400" dirty="0" smtClean="0"/>
+              <a:t>)</a:t>
+            </a:r>
+          </a:p>
+          <a:p>
+            <a:pPr lvl="1"/>
+            <a:endParaRPr lang="en-US" altLang="ko-KR" sz="1400" dirty="0"/>
+          </a:p>
+          <a:p>
+            <a:pPr lvl="1"/>
+            <a:r>
+              <a:rPr lang="en-US" altLang="ko-KR" sz="1400" dirty="0"/>
+              <a:t>ALTER TABLE CATEGORYMGR</a:t>
+            </a:r>
+          </a:p>
+          <a:p>
+            <a:pPr lvl="1"/>
+            <a:r>
+              <a:rPr lang="en-US" altLang="ko-KR" sz="1400" dirty="0"/>
+              <a:t>ADD</a:t>
+            </a:r>
+          </a:p>
+          <a:p>
+            <a:pPr lvl="1"/>
+            <a:r>
+              <a:rPr lang="en-US" altLang="ko-KR" sz="1400" dirty="0"/>
+              <a:t>CONSTRAINT USRNO_CAT_UK UNIQUE (USER_NO)</a:t>
+            </a:r>
+          </a:p>
+          <a:p>
+            <a:pPr lvl="1"/>
+            <a:endParaRPr lang="ko-KR" altLang="en-US" sz="1400" dirty="0" smtClean="0"/>
+          </a:p>
+          <a:p>
+            <a:pPr lvl="1"/>
+            <a:endParaRPr lang="ko-KR" altLang="en-US" sz="1400" dirty="0"/>
+          </a:p>
+        </p:txBody>
+      </p:sp>
+    </p:spTree>
+    <p:extLst>
+      <p:ext uri="{BB962C8B-B14F-4D97-AF65-F5344CB8AC3E}">
+        <p14:creationId xmlns:p14="http://schemas.microsoft.com/office/powerpoint/2010/main" val="3474149023"/>
+      </p:ext>
+    </p:extLst>
+  </p:cSld>
+  <p:clrMapOvr>
+    <a:masterClrMapping/>
+  </p:clrMapOvr>
+</p:sld>
+</file>
+
+<file path=ppt/slides/slide12.xml><?xml version="1.0" encoding="utf-8"?>
+<p:sld xmlns:a="http://schemas.openxmlformats.org/drawingml/2006/main" xmlns:r="http://schemas.openxmlformats.org/officeDocument/2006/relationships" xmlns:p="http://schemas.openxmlformats.org/presentationml/2006/main">
+  <p:cSld>
+    <p:spTree>
+      <p:nvGrpSpPr>
+        <p:cNvPr id="1" name=""/>
+        <p:cNvGrpSpPr/>
+        <p:nvPr/>
+      </p:nvGrpSpPr>
+      <p:grpSpPr>
+        <a:xfrm>
+          <a:off x="0" y="0"/>
+          <a:ext cx="0" cy="0"/>
+          <a:chOff x="0" y="0"/>
+          <a:chExt cx="0" cy="0"/>
+        </a:xfrm>
+      </p:grpSpPr>
+      <p:sp>
+        <p:nvSpPr>
+          <p:cNvPr id="2" name="텍스트 개체 틀 1"/>
+          <p:cNvSpPr>
+            <a:spLocks noGrp="1"/>
+          </p:cNvSpPr>
+          <p:nvPr>
+            <p:ph type="body" sz="quarter" idx="10"/>
+          </p:nvPr>
+        </p:nvSpPr>
+        <p:spPr/>
+        <p:txBody>
+          <a:bodyPr/>
+          <a:lstStyle/>
+          <a:p>
+            <a:endParaRPr lang="ko-KR" altLang="en-US"/>
+          </a:p>
+        </p:txBody>
+      </p:sp>
+    </p:spTree>
+    <p:extLst>
+      <p:ext uri="{BB962C8B-B14F-4D97-AF65-F5344CB8AC3E}">
+        <p14:creationId xmlns:p14="http://schemas.microsoft.com/office/powerpoint/2010/main" val="3298632226"/>
+      </p:ext>
+    </p:extLst>
+  </p:cSld>
+  <p:clrMapOvr>
+    <a:masterClrMapping/>
+  </p:clrMapOvr>
+</p:sld>
+</file>
+
 <file path=ppt/slides/slide2.xml><?xml version="1.0" encoding="utf-8"?>
 <p:sld xmlns:a="http://schemas.openxmlformats.org/drawingml/2006/main" xmlns:r="http://schemas.openxmlformats.org/officeDocument/2006/relationships" xmlns:p="http://schemas.openxmlformats.org/presentationml/2006/main">
   <p:cSld>
@@ -5688,14 +6784,14 @@
           <p:nvPr>
             <p:extLst>
               <p:ext uri="{D42A27DB-BD31-4B8C-83A1-F6EECF244321}">
-                <p14:modId xmlns:p14="http://schemas.microsoft.com/office/powerpoint/2010/main" val="3770439345"/>
+                <p14:modId xmlns:p14="http://schemas.microsoft.com/office/powerpoint/2010/main" val="3045206284"/>
               </p:ext>
             </p:extLst>
           </p:nvPr>
         </p:nvGraphicFramePr>
         <p:xfrm>
-          <a:off x="1367642" y="1994355"/>
-          <a:ext cx="1440160" cy="1368152"/>
+          <a:off x="683568" y="2428338"/>
+          <a:ext cx="1440160" cy="2232248"/>
         </p:xfrm>
         <a:graphic>
           <a:graphicData uri="http://schemas.openxmlformats.org/drawingml/2006/table">
@@ -5715,7 +6811,7 @@
                       <a:pPr algn="ctr" latinLnBrk="1"/>
                       <a:r>
                         <a:rPr lang="en-US" altLang="ko-KR" sz="1200" dirty="0" smtClean="0"/>
-                        <a:t>Member</a:t>
+                        <a:t>REGISTER</a:t>
                       </a:r>
                       <a:endParaRPr lang="ko-KR" altLang="en-US" sz="1200" dirty="0"/>
                     </a:p>
@@ -5776,13 +6872,8 @@
                         </a:spcAft>
                       </a:pPr>
                       <a:r>
-                        <a:rPr lang="en-US" altLang="ko-KR" sz="1000" kern="100" baseline="0" dirty="0" smtClean="0">
-                          <a:effectLst/>
-                          <a:latin typeface="+mn-lt"/>
-                          <a:ea typeface="+mn-ea"/>
-                          <a:cs typeface="+mn-cs"/>
-                        </a:rPr>
-                        <a:t>ID</a:t>
+                        <a:rPr lang="en-US" altLang="ko-KR" sz="1000" dirty="0" smtClean="0"/>
+                        <a:t>ACCID</a:t>
                       </a:r>
                       <a:endParaRPr lang="ko-KR" sz="1000" kern="100" dirty="0">
                         <a:effectLst/>
@@ -5810,10 +6901,8 @@
                         </a:spcAft>
                       </a:pPr>
                       <a:r>
-                        <a:rPr lang="en-US" sz="1000" kern="100" dirty="0" smtClean="0">
-                          <a:effectLst/>
-                        </a:rPr>
-                        <a:t>PW</a:t>
+                        <a:rPr lang="en-US" altLang="ko-KR" sz="1000" dirty="0" smtClean="0"/>
+                        <a:t>PASSWORD </a:t>
                       </a:r>
                       <a:endParaRPr lang="ko-KR" sz="1000" kern="100" dirty="0">
                         <a:effectLst/>
@@ -5841,10 +6930,8 @@
                         </a:spcAft>
                       </a:pPr>
                       <a:r>
-                        <a:rPr lang="en-US" sz="1000" kern="100" dirty="0" smtClean="0">
-                          <a:effectLst/>
-                        </a:rPr>
-                        <a:t>LOGIN_DATE</a:t>
+                        <a:rPr lang="en-US" altLang="ko-KR" sz="1000" dirty="0" smtClean="0"/>
+                        <a:t>NAME </a:t>
                       </a:r>
                       <a:endParaRPr lang="ko-KR" sz="1000" kern="100" dirty="0">
                         <a:effectLst/>
@@ -5872,13 +6959,124 @@
                         </a:spcAft>
                       </a:pPr>
                       <a:r>
-                        <a:rPr lang="en-US" altLang="ko-KR" sz="1000" kern="100" dirty="0" smtClean="0">
-                          <a:effectLst/>
-                          <a:latin typeface="+mn-lt"/>
-                          <a:ea typeface="+mn-ea"/>
-                          <a:cs typeface="Times New Roman"/>
-                        </a:rPr>
-                        <a:t>RESIGN</a:t>
+                        <a:rPr lang="en-US" altLang="ko-KR" sz="1000" dirty="0" smtClean="0"/>
+                        <a:t>AGE </a:t>
+                      </a:r>
+                      <a:endParaRPr lang="ko-KR" sz="1000" kern="100" dirty="0">
+                        <a:effectLst/>
+                        <a:latin typeface="맑은 고딕"/>
+                        <a:ea typeface="맑은 고딕"/>
+                        <a:cs typeface="Times New Roman"/>
+                      </a:endParaRPr>
+                    </a:p>
+                  </a:txBody>
+                  <a:tcPr marL="68580" marR="68580" marT="0" marB="0"/>
+                </a:tc>
+              </a:tr>
+              <a:tr h="216024">
+                <a:tc>
+                  <a:txBody>
+                    <a:bodyPr/>
+                    <a:lstStyle/>
+                    <a:p>
+                      <a:pPr algn="just" latinLnBrk="1">
+                        <a:lnSpc>
+                          <a:spcPct val="115000"/>
+                        </a:lnSpc>
+                        <a:spcAft>
+                          <a:spcPts val="0"/>
+                        </a:spcAft>
+                      </a:pPr>
+                      <a:r>
+                        <a:rPr lang="en-US" altLang="ko-KR" sz="1000" dirty="0" smtClean="0"/>
+                        <a:t>GENDER </a:t>
+                      </a:r>
+                      <a:endParaRPr lang="ko-KR" sz="1000" kern="100" dirty="0">
+                        <a:effectLst/>
+                        <a:latin typeface="맑은 고딕"/>
+                        <a:ea typeface="맑은 고딕"/>
+                        <a:cs typeface="Times New Roman"/>
+                      </a:endParaRPr>
+                    </a:p>
+                  </a:txBody>
+                  <a:tcPr marL="68580" marR="68580" marT="0" marB="0"/>
+                </a:tc>
+              </a:tr>
+              <a:tr h="216024">
+                <a:tc>
+                  <a:txBody>
+                    <a:bodyPr/>
+                    <a:lstStyle/>
+                    <a:p>
+                      <a:pPr algn="just" latinLnBrk="1">
+                        <a:lnSpc>
+                          <a:spcPct val="115000"/>
+                        </a:lnSpc>
+                        <a:spcAft>
+                          <a:spcPts val="0"/>
+                        </a:spcAft>
+                      </a:pPr>
+                      <a:r>
+                        <a:rPr lang="en-US" altLang="ko-KR" sz="1000" dirty="0" smtClean="0"/>
+                        <a:t>EMAIL </a:t>
+                      </a:r>
+                      <a:endParaRPr lang="ko-KR" sz="1000" kern="100" dirty="0">
+                        <a:effectLst/>
+                        <a:latin typeface="맑은 고딕"/>
+                        <a:ea typeface="맑은 고딕"/>
+                        <a:cs typeface="Times New Roman"/>
+                      </a:endParaRPr>
+                    </a:p>
+                  </a:txBody>
+                  <a:tcPr marL="68580" marR="68580" marT="0" marB="0"/>
+                </a:tc>
+              </a:tr>
+              <a:tr h="216024">
+                <a:tc>
+                  <a:txBody>
+                    <a:bodyPr/>
+                    <a:lstStyle/>
+                    <a:p>
+                      <a:pPr algn="just" latinLnBrk="1">
+                        <a:lnSpc>
+                          <a:spcPct val="115000"/>
+                        </a:lnSpc>
+                        <a:spcAft>
+                          <a:spcPts val="0"/>
+                        </a:spcAft>
+                      </a:pPr>
+                      <a:r>
+                        <a:rPr lang="en-US" altLang="ko-KR" sz="1000" dirty="0" smtClean="0"/>
+                        <a:t>REGDATE </a:t>
+                      </a:r>
+                      <a:endParaRPr lang="ko-KR" sz="1000" kern="100" dirty="0">
+                        <a:effectLst/>
+                        <a:latin typeface="맑은 고딕"/>
+                        <a:ea typeface="맑은 고딕"/>
+                        <a:cs typeface="Times New Roman"/>
+                      </a:endParaRPr>
+                    </a:p>
+                  </a:txBody>
+                  <a:tcPr marL="68580" marR="68580" marT="0" marB="0"/>
+                </a:tc>
+              </a:tr>
+              <a:tr h="216024">
+                <a:tc>
+                  <a:txBody>
+                    <a:bodyPr/>
+                    <a:lstStyle/>
+                    <a:p>
+                      <a:pPr algn="just" latinLnBrk="1">
+                        <a:lnSpc>
+                          <a:spcPct val="115000"/>
+                        </a:lnSpc>
+                        <a:spcAft>
+                          <a:spcPts val="0"/>
+                        </a:spcAft>
+                      </a:pPr>
+                      <a:r>
+                        <a:rPr lang="en-US" altLang="ko-KR" sz="1000" dirty="0" smtClean="0"/>
+                        <a:t>RESIGN </a:t>
                       </a:r>
                       <a:endParaRPr lang="ko-KR" sz="1000" kern="100" dirty="0">
                         <a:effectLst/>
@@ -5904,13 +7102,13 @@
           <p:nvPr>
             <p:extLst>
               <p:ext uri="{D42A27DB-BD31-4B8C-83A1-F6EECF244321}">
-                <p14:modId xmlns:p14="http://schemas.microsoft.com/office/powerpoint/2010/main" val="3688218471"/>
+                <p14:modId xmlns:p14="http://schemas.microsoft.com/office/powerpoint/2010/main" val="2621209129"/>
               </p:ext>
             </p:extLst>
           </p:nvPr>
         </p:nvGraphicFramePr>
         <p:xfrm>
-          <a:off x="3599890" y="2012076"/>
+          <a:off x="2741562" y="1346181"/>
           <a:ext cx="1440160" cy="1584176"/>
         </p:xfrm>
         <a:graphic>
@@ -5930,8 +7128,8 @@
                     <a:p>
                       <a:pPr algn="ctr" latinLnBrk="1"/>
                       <a:r>
-                        <a:rPr lang="en-US" altLang="ko-KR" sz="1200" dirty="0" smtClean="0"/>
-                        <a:t>Income</a:t>
+                        <a:rPr lang="en-US" altLang="ko-KR" sz="1200" b="1" dirty="0" smtClean="0"/>
+                        <a:t>INCOMES</a:t>
                       </a:r>
                       <a:endParaRPr lang="ko-KR" altLang="en-US" sz="1200" dirty="0"/>
                     </a:p>
@@ -5975,40 +7173,6 @@
                       <a:srgbClr val="FFC000"/>
                     </a:solidFill>
                   </a:tcPr>
-                </a:tc>
-              </a:tr>
-              <a:tr h="216024">
-                <a:tc>
-                  <a:txBody>
-                    <a:bodyPr/>
-                    <a:lstStyle/>
-                    <a:p>
-                      <a:pPr algn="just" latinLnBrk="1">
-                        <a:lnSpc>
-                          <a:spcPct val="115000"/>
-                        </a:lnSpc>
-                        <a:spcAft>
-                          <a:spcPts val="0"/>
-                        </a:spcAft>
-                      </a:pPr>
-                      <a:r>
-                        <a:rPr lang="en-US" altLang="ko-KR" sz="1000" kern="100" baseline="0" dirty="0" smtClean="0">
-                          <a:effectLst/>
-                          <a:latin typeface="+mn-lt"/>
-                          <a:ea typeface="+mn-ea"/>
-                          <a:cs typeface="+mn-cs"/>
-                        </a:rPr>
-                        <a:t>ITEMS</a:t>
-                      </a:r>
-                      <a:endParaRPr lang="ko-KR" sz="1000" kern="100" dirty="0">
-                        <a:effectLst/>
-                        <a:latin typeface="맑은 고딕"/>
-                        <a:ea typeface="맑은 고딕"/>
-                        <a:cs typeface="Times New Roman"/>
-                      </a:endParaRPr>
-                    </a:p>
-                  </a:txBody>
-                  <a:tcPr marL="68580" marR="68580" marT="0" marB="0"/>
                 </a:tc>
               </a:tr>
               <a:tr h="216024">
@@ -6113,7 +7277,7 @@
                           </a:solidFill>
                           <a:cs typeface="Times New Roman"/>
                         </a:rPr>
-                        <a:t>DATE</a:t>
+                        <a:t>INC_DATE</a:t>
                       </a:r>
                       <a:endParaRPr lang="ko-KR" altLang="ko-KR" sz="1000" kern="100" dirty="0">
                         <a:effectLst/>
@@ -6155,12 +7319,12 @@
                       </a:pPr>
                       <a:r>
                         <a:rPr lang="en-US" altLang="ko-KR" sz="1000" kern="100" dirty="0" smtClean="0">
-                          <a:effectLst/>
-                          <a:latin typeface="+mn-lt"/>
-                          <a:ea typeface="+mn-ea"/>
+                          <a:solidFill>
+                            <a:srgbClr val="000000"/>
+                          </a:solidFill>
                           <a:cs typeface="Times New Roman"/>
                         </a:rPr>
-                        <a:t>ASSETS</a:t>
+                        <a:t>ACCOUNTNO</a:t>
                       </a:r>
                       <a:endParaRPr lang="ko-KR" altLang="ko-KR" sz="1000" kern="100" dirty="0">
                         <a:effectLst/>
@@ -6172,7 +7336,49 @@
                   </a:txBody>
                   <a:tcPr marL="68580" marR="68580" marT="0" marB="0">
                     <a:solidFill>
-                      <a:schemeClr val="bg1"/>
+                      <a:srgbClr val="FFFF00"/>
+                    </a:solidFill>
+                  </a:tcPr>
+                </a:tc>
+              </a:tr>
+              <a:tr h="216024">
+                <a:tc>
+                  <a:txBody>
+                    <a:bodyPr/>
+                    <a:lstStyle/>
+                    <a:p>
+                      <a:pPr marL="0" marR="0" indent="0" algn="just" defTabSz="914400" rtl="0" eaLnBrk="1" fontAlgn="auto" latinLnBrk="1" hangingPunct="1">
+                        <a:lnSpc>
+                          <a:spcPct val="115000"/>
+                        </a:lnSpc>
+                        <a:spcBef>
+                          <a:spcPts val="0"/>
+                        </a:spcBef>
+                        <a:spcAft>
+                          <a:spcPts val="0"/>
+                        </a:spcAft>
+                        <a:buClrTx/>
+                        <a:buSzTx/>
+                        <a:buFontTx/>
+                        <a:buNone/>
+                        <a:tabLst/>
+                        <a:defRPr/>
+                      </a:pPr>
+                      <a:r>
+                        <a:rPr lang="en-US" altLang="ko-KR" sz="1000" dirty="0" smtClean="0"/>
+                        <a:t>CATEGORYNO</a:t>
+                      </a:r>
+                      <a:endParaRPr lang="ko-KR" altLang="ko-KR" sz="1000" kern="100" dirty="0">
+                        <a:effectLst/>
+                        <a:latin typeface="+mn-lt"/>
+                        <a:ea typeface="+mn-ea"/>
+                        <a:cs typeface="Times New Roman"/>
+                      </a:endParaRPr>
+                    </a:p>
+                  </a:txBody>
+                  <a:tcPr marL="68580" marR="68580" marT="0" marB="0">
+                    <a:solidFill>
+                      <a:srgbClr val="FFFF00"/>
                     </a:solidFill>
                   </a:tcPr>
                 </a:tc>
@@ -6188,13 +7394,13 @@
           <p:nvPr/>
         </p:nvCxnSpPr>
         <p:spPr>
-          <a:xfrm flipV="1">
-            <a:off x="2798913" y="2359572"/>
-            <a:ext cx="800977" cy="1"/>
+          <a:xfrm rot="5400000" flipH="1" flipV="1">
+            <a:off x="1733062" y="2019468"/>
+            <a:ext cx="1080120" cy="442803"/>
           </a:xfrm>
           <a:prstGeom prst="bentConnector3">
             <a:avLst>
-              <a:gd name="adj1" fmla="val 50000"/>
+              <a:gd name="adj1" fmla="val 616"/>
             </a:avLst>
           </a:prstGeom>
           <a:ln w="28575">
@@ -6226,7 +7432,7 @@
         </p:nvSpPr>
         <p:spPr>
           <a:xfrm>
-            <a:off x="2807802" y="2082573"/>
+            <a:off x="2106094" y="2426402"/>
             <a:ext cx="288032" cy="276999"/>
           </a:xfrm>
           <a:prstGeom prst="rect">
@@ -6248,36 +7454,6 @@
           </a:p>
         </p:txBody>
       </p:sp>
-      <p:sp>
-        <p:nvSpPr>
-          <p:cNvPr id="7" name="TextBox 6"/>
-          <p:cNvSpPr txBox="1"/>
-          <p:nvPr/>
-        </p:nvSpPr>
-        <p:spPr>
-          <a:xfrm>
-            <a:off x="3311860" y="2089261"/>
-            <a:ext cx="288032" cy="276999"/>
-          </a:xfrm>
-          <a:prstGeom prst="rect">
-            <a:avLst/>
-          </a:prstGeom>
-          <a:noFill/>
-        </p:spPr>
-        <p:txBody>
-          <a:bodyPr wrap="square" rtlCol="0">
-            <a:spAutoFit/>
-          </a:bodyPr>
-          <a:lstStyle/>
-          <a:p>
-            <a:r>
-              <a:rPr lang="en-US" altLang="ko-KR" sz="1200" dirty="0" smtClean="0"/>
-              <a:t>1</a:t>
-            </a:r>
-            <a:endParaRPr lang="ko-KR" altLang="en-US" sz="1200" dirty="0"/>
-          </a:p>
-        </p:txBody>
-      </p:sp>
       <p:graphicFrame>
         <p:nvGraphicFramePr>
           <p:cNvPr id="8" name="표 7"/>
@@ -6287,13 +7463,13 @@
           <p:nvPr>
             <p:extLst>
               <p:ext uri="{D42A27DB-BD31-4B8C-83A1-F6EECF244321}">
-                <p14:modId xmlns:p14="http://schemas.microsoft.com/office/powerpoint/2010/main" val="4184773602"/>
+                <p14:modId xmlns:p14="http://schemas.microsoft.com/office/powerpoint/2010/main" val="3169596078"/>
               </p:ext>
             </p:extLst>
           </p:nvPr>
         </p:nvGraphicFramePr>
         <p:xfrm>
-          <a:off x="2735796" y="3861048"/>
+          <a:off x="2749574" y="4005064"/>
           <a:ext cx="1440160" cy="1584176"/>
         </p:xfrm>
         <a:graphic>
@@ -6313,8 +7489,8 @@
                     <a:p>
                       <a:pPr algn="ctr" latinLnBrk="1"/>
                       <a:r>
-                        <a:rPr lang="en-US" altLang="ko-KR" sz="1200" dirty="0" smtClean="0"/>
-                        <a:t>Expenses</a:t>
+                        <a:rPr lang="en-US" altLang="ko-KR" sz="1200" b="1" dirty="0" smtClean="0"/>
+                        <a:t>EXPENSES</a:t>
                       </a:r>
                       <a:endParaRPr lang="ko-KR" altLang="en-US" sz="1200" dirty="0"/>
                     </a:p>
@@ -6375,47 +7551,8 @@
                         </a:spcAft>
                       </a:pPr>
                       <a:r>
-                        <a:rPr lang="en-US" altLang="ko-KR" sz="1000" kern="100" baseline="0" dirty="0" smtClean="0">
-                          <a:effectLst/>
-                          <a:latin typeface="+mn-lt"/>
-                          <a:ea typeface="+mn-ea"/>
-                          <a:cs typeface="+mn-cs"/>
-                        </a:rPr>
-                        <a:t>ITEMS</a:t>
-                      </a:r>
-                      <a:endParaRPr lang="ko-KR" sz="1000" kern="100" dirty="0">
-                        <a:effectLst/>
-                        <a:latin typeface="맑은 고딕"/>
-                        <a:ea typeface="맑은 고딕"/>
-                        <a:cs typeface="Times New Roman"/>
-                      </a:endParaRPr>
-                    </a:p>
-                  </a:txBody>
-                  <a:tcPr marL="68580" marR="68580" marT="0" marB="0"/>
-                </a:tc>
-              </a:tr>
-              <a:tr h="216024">
-                <a:tc>
-                  <a:txBody>
-                    <a:bodyPr/>
-                    <a:lstStyle/>
-                    <a:p>
-                      <a:pPr algn="just" latinLnBrk="1">
-                        <a:lnSpc>
-                          <a:spcPct val="115000"/>
-                        </a:lnSpc>
-                        <a:spcAft>
-                          <a:spcPts val="0"/>
-                        </a:spcAft>
-                      </a:pPr>
-                      <a:r>
-                        <a:rPr lang="en-US" altLang="ko-KR" sz="1000" kern="100" dirty="0" smtClean="0">
-                          <a:effectLst/>
-                          <a:latin typeface="맑은 고딕"/>
-                          <a:ea typeface="맑은 고딕"/>
-                          <a:cs typeface="Times New Roman"/>
-                        </a:rPr>
-                        <a:t>AMOUNTS</a:t>
+                        <a:rPr lang="en-US" altLang="ko-KR" sz="1000" dirty="0" smtClean="0"/>
+                        <a:t>SPEND</a:t>
                       </a:r>
                       <a:endParaRPr lang="ko-KR" sz="1000" kern="100" dirty="0">
                         <a:effectLst/>
@@ -6551,14 +7688,56 @@
                       <a:r>
                         <a:rPr lang="en-US" altLang="ko-KR" sz="1000" kern="100" dirty="0" smtClean="0">
                           <a:solidFill>
-                            <a:schemeClr val="tx1"/>
+                            <a:srgbClr val="000000"/>
                           </a:solidFill>
-                          <a:effectLst/>
-                          <a:latin typeface="맑은 고딕"/>
-                          <a:ea typeface="맑은 고딕"/>
                           <a:cs typeface="Times New Roman"/>
                         </a:rPr>
-                        <a:t>ASSETS</a:t>
+                        <a:t>ACCOUNTNO</a:t>
+                      </a:r>
+                      <a:endParaRPr lang="ko-KR" altLang="ko-KR" sz="1000" kern="100" dirty="0">
+                        <a:solidFill>
+                          <a:schemeClr val="tx1"/>
+                        </a:solidFill>
+                        <a:effectLst/>
+                        <a:latin typeface="맑은 고딕"/>
+                        <a:ea typeface="맑은 고딕"/>
+                        <a:cs typeface="Times New Roman"/>
+                      </a:endParaRPr>
+                    </a:p>
+                  </a:txBody>
+                  <a:tcPr marL="68580" marR="68580" marT="0" marB="0">
+                    <a:solidFill>
+                      <a:srgbClr val="FFFF00"/>
+                    </a:solidFill>
+                  </a:tcPr>
+                </a:tc>
+              </a:tr>
+              <a:tr h="216024">
+                <a:tc>
+                  <a:txBody>
+                    <a:bodyPr/>
+                    <a:lstStyle/>
+                    <a:p>
+                      <a:pPr marL="0" marR="0" indent="0" algn="just" defTabSz="914400" rtl="0" eaLnBrk="1" fontAlgn="auto" latinLnBrk="1" hangingPunct="1">
+                        <a:lnSpc>
+                          <a:spcPct val="115000"/>
+                        </a:lnSpc>
+                        <a:spcBef>
+                          <a:spcPts val="0"/>
+                        </a:spcBef>
+                        <a:spcAft>
+                          <a:spcPts val="0"/>
+                        </a:spcAft>
+                        <a:buClrTx/>
+                        <a:buSzTx/>
+                        <a:buFontTx/>
+                        <a:buNone/>
+                        <a:tabLst/>
+                        <a:defRPr/>
+                      </a:pPr>
+                      <a:r>
+                        <a:rPr lang="en-US" altLang="ko-KR" sz="1000" dirty="0" smtClean="0"/>
+                        <a:t>CATEGORYNO</a:t>
                       </a:r>
                       <a:endParaRPr lang="ko-KR" altLang="ko-KR" sz="1000" kern="100" dirty="0">
                         <a:solidFill>
@@ -6590,7 +7769,7 @@
         </p:nvCxnSpPr>
         <p:spPr>
           <a:xfrm rot="16200000" flipV="1">
-            <a:off x="2311881" y="2922325"/>
+            <a:off x="1555799" y="3343641"/>
             <a:ext cx="1434644" cy="442802"/>
           </a:xfrm>
           <a:prstGeom prst="bentConnector2">
@@ -6625,7 +7804,7 @@
         </p:nvSpPr>
         <p:spPr>
           <a:xfrm>
-            <a:off x="2807802" y="2426403"/>
+            <a:off x="2106094" y="2886999"/>
             <a:ext cx="288032" cy="276999"/>
           </a:xfrm>
           <a:prstGeom prst="rect">
@@ -6647,36 +7826,6 @@
           </a:p>
         </p:txBody>
       </p:sp>
-      <p:sp>
-        <p:nvSpPr>
-          <p:cNvPr id="15" name="TextBox 14"/>
-          <p:cNvSpPr txBox="1"/>
-          <p:nvPr/>
-        </p:nvSpPr>
-        <p:spPr>
-          <a:xfrm>
-            <a:off x="3258574" y="3578585"/>
-            <a:ext cx="288032" cy="276999"/>
-          </a:xfrm>
-          <a:prstGeom prst="rect">
-            <a:avLst/>
-          </a:prstGeom>
-          <a:noFill/>
-        </p:spPr>
-        <p:txBody>
-          <a:bodyPr wrap="square" rtlCol="0">
-            <a:spAutoFit/>
-          </a:bodyPr>
-          <a:lstStyle/>
-          <a:p>
-            <a:r>
-              <a:rPr lang="en-US" altLang="ko-KR" sz="1200" dirty="0" smtClean="0"/>
-              <a:t>1</a:t>
-            </a:r>
-            <a:endParaRPr lang="ko-KR" altLang="en-US" sz="1200" dirty="0"/>
-          </a:p>
-        </p:txBody>
-      </p:sp>
       <p:graphicFrame>
         <p:nvGraphicFramePr>
           <p:cNvPr id="19" name="표 18"/>
@@ -6686,14 +7835,14 @@
           <p:nvPr>
             <p:extLst>
               <p:ext uri="{D42A27DB-BD31-4B8C-83A1-F6EECF244321}">
-                <p14:modId xmlns:p14="http://schemas.microsoft.com/office/powerpoint/2010/main" val="1681549153"/>
+                <p14:modId xmlns:p14="http://schemas.microsoft.com/office/powerpoint/2010/main" val="2887113125"/>
               </p:ext>
             </p:extLst>
           </p:nvPr>
         </p:nvGraphicFramePr>
         <p:xfrm>
-          <a:off x="6264186" y="2030413"/>
-          <a:ext cx="1440160" cy="1368152"/>
+          <a:off x="6264186" y="1811173"/>
+          <a:ext cx="1440160" cy="1800200"/>
         </p:xfrm>
         <a:graphic>
           <a:graphicData uri="http://schemas.openxmlformats.org/drawingml/2006/table">
@@ -6712,8 +7861,8 @@
                     <a:p>
                       <a:pPr algn="ctr" latinLnBrk="1"/>
                       <a:r>
-                        <a:rPr lang="en-US" altLang="ko-KR" sz="1200" dirty="0" smtClean="0"/>
-                        <a:t>ASSETS</a:t>
+                        <a:rPr lang="en-US" altLang="ko-KR" sz="1200" b="1" dirty="0" smtClean="0"/>
+                        <a:t>ACCOUNTMGR</a:t>
                       </a:r>
                       <a:endParaRPr lang="ko-KR" altLang="en-US" sz="1200" dirty="0"/>
                     </a:p>
@@ -6737,50 +7886,12 @@
                       </a:pPr>
                       <a:r>
                         <a:rPr lang="en-US" altLang="ko-KR" sz="1000" kern="100" dirty="0" smtClean="0">
-                          <a:effectLst/>
-                          <a:latin typeface="맑은 고딕"/>
-                          <a:ea typeface="맑은 고딕"/>
+                          <a:solidFill>
+                            <a:srgbClr val="000000"/>
+                          </a:solidFill>
                           <a:cs typeface="Times New Roman"/>
                         </a:rPr>
-                        <a:t>TYPE</a:t>
-                      </a:r>
-                      <a:endParaRPr lang="ko-KR" sz="1000" kern="100" dirty="0">
-                        <a:effectLst/>
-                        <a:latin typeface="맑은 고딕"/>
-                        <a:ea typeface="맑은 고딕"/>
-                        <a:cs typeface="Times New Roman"/>
-                      </a:endParaRPr>
-                    </a:p>
-                  </a:txBody>
-                  <a:tcPr marL="68580" marR="68580" marT="0" marB="0">
-                    <a:solidFill>
-                      <a:schemeClr val="bg1"/>
-                    </a:solidFill>
-                  </a:tcPr>
-                </a:tc>
-              </a:tr>
-              <a:tr h="216024">
-                <a:tc>
-                  <a:txBody>
-                    <a:bodyPr/>
-                    <a:lstStyle/>
-                    <a:p>
-                      <a:pPr algn="just" latinLnBrk="1">
-                        <a:lnSpc>
-                          <a:spcPct val="115000"/>
-                        </a:lnSpc>
-                        <a:spcAft>
-                          <a:spcPts val="0"/>
-                        </a:spcAft>
-                      </a:pPr>
-                      <a:r>
-                        <a:rPr lang="en-US" altLang="ko-KR" sz="1000" kern="100" baseline="0" dirty="0" smtClean="0">
-                          <a:effectLst/>
-                          <a:latin typeface="+mn-lt"/>
-                          <a:ea typeface="+mn-ea"/>
-                          <a:cs typeface="+mn-cs"/>
-                        </a:rPr>
-                        <a:t>NAME</a:t>
+                        <a:t>ACCOUNTNO</a:t>
                       </a:r>
                       <a:endParaRPr lang="ko-KR" sz="1000" kern="100" dirty="0">
                         <a:effectLst/>
@@ -6812,13 +7923,44 @@
                         </a:spcAft>
                       </a:pPr>
                       <a:r>
+                        <a:rPr lang="en-US" altLang="ko-KR" sz="1000" dirty="0" smtClean="0"/>
+                        <a:t>ACCOUNT</a:t>
+                      </a:r>
+                      <a:endParaRPr lang="ko-KR" sz="1000" kern="100" dirty="0">
+                        <a:effectLst/>
+                        <a:latin typeface="맑은 고딕"/>
+                        <a:ea typeface="맑은 고딕"/>
+                        <a:cs typeface="Times New Roman"/>
+                      </a:endParaRPr>
+                    </a:p>
+                  </a:txBody>
+                  <a:tcPr marL="68580" marR="68580" marT="0" marB="0">
+                    <a:noFill/>
+                  </a:tcPr>
+                </a:tc>
+              </a:tr>
+              <a:tr h="216024">
+                <a:tc>
+                  <a:txBody>
+                    <a:bodyPr/>
+                    <a:lstStyle/>
+                    <a:p>
+                      <a:pPr algn="just" latinLnBrk="1">
+                        <a:lnSpc>
+                          <a:spcPct val="115000"/>
+                        </a:lnSpc>
+                        <a:spcAft>
+                          <a:spcPts val="0"/>
+                        </a:spcAft>
+                      </a:pPr>
+                      <a:r>
                         <a:rPr lang="en-US" altLang="ko-KR" sz="1000" kern="100" dirty="0" smtClean="0">
                           <a:effectLst/>
-                          <a:latin typeface="맑은 고딕"/>
-                          <a:ea typeface="맑은 고딕"/>
+                          <a:latin typeface="+mn-lt"/>
+                          <a:ea typeface="+mn-ea"/>
                           <a:cs typeface="Times New Roman"/>
                         </a:rPr>
-                        <a:t>BALANCE</a:t>
+                        <a:t>ACCTYPE</a:t>
                       </a:r>
                       <a:endParaRPr lang="ko-KR" sz="1000" kern="100" dirty="0">
                         <a:effectLst/>
@@ -6898,12 +8040,12 @@
                       </a:pPr>
                       <a:r>
                         <a:rPr lang="en-US" altLang="ko-KR" sz="1000" kern="100" dirty="0" smtClean="0">
-                          <a:solidFill>
-                            <a:srgbClr val="000000"/>
-                          </a:solidFill>
+                          <a:effectLst/>
+                          <a:latin typeface="+mn-lt"/>
+                          <a:ea typeface="+mn-ea"/>
                           <a:cs typeface="Times New Roman"/>
                         </a:rPr>
-                        <a:t>ACCOUNTNO</a:t>
+                        <a:t>BALANCE</a:t>
                       </a:r>
                       <a:endParaRPr lang="ko-KR" altLang="ko-KR" sz="1000" kern="100" dirty="0">
                         <a:effectLst/>
@@ -6920,6 +8062,98 @@
                   </a:tcPr>
                 </a:tc>
               </a:tr>
+              <a:tr h="216024">
+                <a:tc>
+                  <a:txBody>
+                    <a:bodyPr/>
+                    <a:lstStyle/>
+                    <a:p>
+                      <a:pPr marL="0" marR="0" indent="0" algn="just" defTabSz="914400" rtl="0" eaLnBrk="1" fontAlgn="auto" latinLnBrk="1" hangingPunct="1">
+                        <a:lnSpc>
+                          <a:spcPct val="115000"/>
+                        </a:lnSpc>
+                        <a:spcBef>
+                          <a:spcPts val="0"/>
+                        </a:spcBef>
+                        <a:spcAft>
+                          <a:spcPts val="0"/>
+                        </a:spcAft>
+                        <a:buClrTx/>
+                        <a:buSzTx/>
+                        <a:buFontTx/>
+                        <a:buNone/>
+                        <a:tabLst/>
+                        <a:defRPr/>
+                      </a:pPr>
+                      <a:r>
+                        <a:rPr lang="en-US" altLang="ko-KR" sz="1000" kern="100" dirty="0" smtClean="0">
+                          <a:effectLst/>
+                          <a:latin typeface="+mn-lt"/>
+                          <a:ea typeface="+mn-ea"/>
+                          <a:cs typeface="Times New Roman"/>
+                        </a:rPr>
+                        <a:t>USER_NO</a:t>
+                      </a:r>
+                      <a:endParaRPr lang="ko-KR" altLang="ko-KR" sz="1000" kern="100" dirty="0">
+                        <a:effectLst/>
+                        <a:latin typeface="+mn-lt"/>
+                        <a:ea typeface="+mn-ea"/>
+                        <a:cs typeface="Times New Roman"/>
+                      </a:endParaRPr>
+                    </a:p>
+                  </a:txBody>
+                  <a:tcPr marL="68580" marR="68580" marT="0" marB="0">
+                    <a:solidFill>
+                      <a:srgbClr val="FFC000"/>
+                    </a:solidFill>
+                  </a:tcPr>
+                </a:tc>
+              </a:tr>
+              <a:tr h="216024">
+                <a:tc>
+                  <a:txBody>
+                    <a:bodyPr/>
+                    <a:lstStyle/>
+                    <a:p>
+                      <a:pPr marL="0" marR="0" indent="0" algn="just" defTabSz="914400" rtl="0" eaLnBrk="1" fontAlgn="auto" latinLnBrk="1" hangingPunct="1">
+                        <a:lnSpc>
+                          <a:spcPct val="115000"/>
+                        </a:lnSpc>
+                        <a:spcBef>
+                          <a:spcPts val="0"/>
+                        </a:spcBef>
+                        <a:spcAft>
+                          <a:spcPts val="0"/>
+                        </a:spcAft>
+                        <a:buClrTx/>
+                        <a:buSzTx/>
+                        <a:buFontTx/>
+                        <a:buNone/>
+                        <a:tabLst/>
+                        <a:defRPr/>
+                      </a:pPr>
+                      <a:r>
+                        <a:rPr lang="en-US" altLang="ko-KR" sz="1000" kern="100" dirty="0" smtClean="0">
+                          <a:effectLst/>
+                          <a:latin typeface="+mn-lt"/>
+                          <a:ea typeface="+mn-ea"/>
+                          <a:cs typeface="Times New Roman"/>
+                        </a:rPr>
+                        <a:t>USAGE</a:t>
+                      </a:r>
+                      <a:endParaRPr lang="ko-KR" altLang="ko-KR" sz="1000" kern="100" dirty="0">
+                        <a:effectLst/>
+                        <a:latin typeface="+mn-lt"/>
+                        <a:ea typeface="+mn-ea"/>
+                        <a:cs typeface="Times New Roman"/>
+                      </a:endParaRPr>
+                    </a:p>
+                  </a:txBody>
+                  <a:tcPr marL="68580" marR="68580" marT="0" marB="0">
+                    <a:noFill/>
+                  </a:tcPr>
+                </a:tc>
+              </a:tr>
             </a:tbl>
           </a:graphicData>
         </a:graphic>
@@ -6932,8 +8166,8 @@
         </p:nvCxnSpPr>
         <p:spPr>
           <a:xfrm flipV="1">
-            <a:off x="5040050" y="2426403"/>
-            <a:ext cx="1224136" cy="1007909"/>
+            <a:off x="4150280" y="2426405"/>
+            <a:ext cx="2113906" cy="138496"/>
           </a:xfrm>
           <a:prstGeom prst="bentConnector3">
             <a:avLst>
@@ -6969,7 +8203,7 @@
         </p:nvSpPr>
         <p:spPr>
           <a:xfrm>
-            <a:off x="5930684" y="2149403"/>
+            <a:off x="5930684" y="2017182"/>
             <a:ext cx="288032" cy="276999"/>
           </a:xfrm>
           <a:prstGeom prst="rect">
@@ -6999,7 +8233,7 @@
         </p:nvSpPr>
         <p:spPr>
           <a:xfrm>
-            <a:off x="5046171" y="3025499"/>
+            <a:off x="4283968" y="2326262"/>
             <a:ext cx="288032" cy="276999"/>
           </a:xfrm>
           <a:prstGeom prst="rect">
@@ -7029,7 +8263,7 @@
         </p:nvCxnSpPr>
         <p:spPr>
           <a:xfrm>
-            <a:off x="5040050" y="3305366"/>
+            <a:off x="4150280" y="2433464"/>
             <a:ext cx="216024" cy="135632"/>
           </a:xfrm>
           <a:prstGeom prst="line">
@@ -7064,7 +8298,7 @@
         </p:nvCxnSpPr>
         <p:spPr>
           <a:xfrm flipV="1">
-            <a:off x="5040050" y="3457246"/>
+            <a:off x="4175601" y="2833137"/>
             <a:ext cx="216024" cy="144016"/>
           </a:xfrm>
           <a:prstGeom prst="line">
@@ -7099,12 +8333,12 @@
         </p:nvCxnSpPr>
         <p:spPr>
           <a:xfrm flipV="1">
-            <a:off x="4175954" y="2578804"/>
-            <a:ext cx="2088232" cy="1719808"/>
+            <a:off x="4175954" y="4143864"/>
+            <a:ext cx="2088232" cy="1373368"/>
           </a:xfrm>
           <a:prstGeom prst="bentConnector3">
             <a:avLst>
-              <a:gd name="adj1" fmla="val 80104"/>
+              <a:gd name="adj1" fmla="val 50000"/>
             </a:avLst>
           </a:prstGeom>
           <a:ln w="28575">
@@ -7136,7 +8370,7 @@
         </p:nvSpPr>
         <p:spPr>
           <a:xfrm>
-            <a:off x="4181722" y="3866865"/>
+            <a:off x="4328204" y="2852936"/>
             <a:ext cx="288032" cy="276999"/>
           </a:xfrm>
           <a:prstGeom prst="rect">
@@ -7166,7 +8400,7 @@
         </p:nvCxnSpPr>
         <p:spPr>
           <a:xfrm>
-            <a:off x="4175601" y="4146732"/>
+            <a:off x="4175601" y="5365352"/>
             <a:ext cx="216024" cy="135632"/>
           </a:xfrm>
           <a:prstGeom prst="line">
@@ -7201,7 +8435,7 @@
         </p:nvCxnSpPr>
         <p:spPr>
           <a:xfrm flipV="1">
-            <a:off x="4175601" y="4298612"/>
+            <a:off x="4175601" y="5517232"/>
             <a:ext cx="216024" cy="144016"/>
           </a:xfrm>
           <a:prstGeom prst="line">
@@ -7228,10 +8462,2163 @@
           </a:fontRef>
         </p:style>
       </p:cxnSp>
+      <p:sp>
+        <p:nvSpPr>
+          <p:cNvPr id="30" name="TextBox 29"/>
+          <p:cNvSpPr txBox="1"/>
+          <p:nvPr/>
+        </p:nvSpPr>
+        <p:spPr>
+          <a:xfrm>
+            <a:off x="2394726" y="4370620"/>
+            <a:ext cx="288032" cy="276999"/>
+          </a:xfrm>
+          <a:prstGeom prst="rect">
+            <a:avLst/>
+          </a:prstGeom>
+          <a:noFill/>
+        </p:spPr>
+        <p:txBody>
+          <a:bodyPr wrap="square" rtlCol="0">
+            <a:spAutoFit/>
+          </a:bodyPr>
+          <a:lstStyle/>
+          <a:p>
+            <a:r>
+              <a:rPr lang="en-US" altLang="ko-KR" sz="1200" dirty="0" smtClean="0"/>
+              <a:t>N</a:t>
+            </a:r>
+            <a:endParaRPr lang="ko-KR" altLang="en-US" sz="1200" dirty="0"/>
+          </a:p>
+        </p:txBody>
+      </p:sp>
+      <p:sp>
+        <p:nvSpPr>
+          <p:cNvPr id="31" name="TextBox 30"/>
+          <p:cNvSpPr txBox="1"/>
+          <p:nvPr/>
+        </p:nvSpPr>
+        <p:spPr>
+          <a:xfrm>
+            <a:off x="2394726" y="1423810"/>
+            <a:ext cx="288032" cy="276999"/>
+          </a:xfrm>
+          <a:prstGeom prst="rect">
+            <a:avLst/>
+          </a:prstGeom>
+          <a:noFill/>
+        </p:spPr>
+        <p:txBody>
+          <a:bodyPr wrap="square" rtlCol="0">
+            <a:spAutoFit/>
+          </a:bodyPr>
+          <a:lstStyle/>
+          <a:p>
+            <a:r>
+              <a:rPr lang="en-US" altLang="ko-KR" sz="1200" dirty="0" smtClean="0"/>
+              <a:t>N</a:t>
+            </a:r>
+            <a:endParaRPr lang="ko-KR" altLang="en-US" sz="1200" dirty="0"/>
+          </a:p>
+        </p:txBody>
+      </p:sp>
+      <p:cxnSp>
+        <p:nvCxnSpPr>
+          <p:cNvPr id="32" name="직선 연결선 31"/>
+          <p:cNvCxnSpPr/>
+          <p:nvPr/>
+        </p:nvCxnSpPr>
+        <p:spPr>
+          <a:xfrm>
+            <a:off x="2494524" y="1764104"/>
+            <a:ext cx="216024" cy="135632"/>
+          </a:xfrm>
+          <a:prstGeom prst="line">
+            <a:avLst/>
+          </a:prstGeom>
+          <a:ln w="28575">
+            <a:solidFill>
+              <a:srgbClr val="FF0000"/>
+            </a:solidFill>
+          </a:ln>
+        </p:spPr>
+        <p:style>
+          <a:lnRef idx="1">
+            <a:schemeClr val="accent2"/>
+          </a:lnRef>
+          <a:fillRef idx="0">
+            <a:schemeClr val="accent2"/>
+          </a:fillRef>
+          <a:effectRef idx="0">
+            <a:schemeClr val="accent2"/>
+          </a:effectRef>
+          <a:fontRef idx="minor">
+            <a:schemeClr val="tx1"/>
+          </a:fontRef>
+        </p:style>
+      </p:cxnSp>
+      <p:cxnSp>
+        <p:nvCxnSpPr>
+          <p:cNvPr id="33" name="직선 연결선 32"/>
+          <p:cNvCxnSpPr/>
+          <p:nvPr/>
+        </p:nvCxnSpPr>
+        <p:spPr>
+          <a:xfrm flipV="1">
+            <a:off x="2494522" y="1582818"/>
+            <a:ext cx="216024" cy="144016"/>
+          </a:xfrm>
+          <a:prstGeom prst="line">
+            <a:avLst/>
+          </a:prstGeom>
+          <a:ln w="28575">
+            <a:solidFill>
+              <a:srgbClr val="FF0000"/>
+            </a:solidFill>
+          </a:ln>
+        </p:spPr>
+        <p:style>
+          <a:lnRef idx="1">
+            <a:schemeClr val="accent2"/>
+          </a:lnRef>
+          <a:fillRef idx="0">
+            <a:schemeClr val="accent2"/>
+          </a:fillRef>
+          <a:effectRef idx="0">
+            <a:schemeClr val="accent2"/>
+          </a:effectRef>
+          <a:fontRef idx="minor">
+            <a:schemeClr val="tx1"/>
+          </a:fontRef>
+        </p:style>
+      </p:cxnSp>
+      <p:cxnSp>
+        <p:nvCxnSpPr>
+          <p:cNvPr id="37" name="직선 연결선 36"/>
+          <p:cNvCxnSpPr/>
+          <p:nvPr/>
+        </p:nvCxnSpPr>
+        <p:spPr>
+          <a:xfrm>
+            <a:off x="2494524" y="1749661"/>
+            <a:ext cx="216024" cy="1"/>
+          </a:xfrm>
+          <a:prstGeom prst="line">
+            <a:avLst/>
+          </a:prstGeom>
+          <a:ln w="28575">
+            <a:solidFill>
+              <a:srgbClr val="FF0000"/>
+            </a:solidFill>
+          </a:ln>
+        </p:spPr>
+        <p:style>
+          <a:lnRef idx="1">
+            <a:schemeClr val="accent2"/>
+          </a:lnRef>
+          <a:fillRef idx="0">
+            <a:schemeClr val="accent2"/>
+          </a:fillRef>
+          <a:effectRef idx="0">
+            <a:schemeClr val="accent2"/>
+          </a:effectRef>
+          <a:fontRef idx="minor">
+            <a:schemeClr val="tx1"/>
+          </a:fontRef>
+        </p:style>
+      </p:cxnSp>
+      <p:cxnSp>
+        <p:nvCxnSpPr>
+          <p:cNvPr id="38" name="직선 연결선 37"/>
+          <p:cNvCxnSpPr/>
+          <p:nvPr/>
+        </p:nvCxnSpPr>
+        <p:spPr>
+          <a:xfrm>
+            <a:off x="2494524" y="4282364"/>
+            <a:ext cx="216024" cy="135632"/>
+          </a:xfrm>
+          <a:prstGeom prst="line">
+            <a:avLst/>
+          </a:prstGeom>
+          <a:ln w="28575">
+            <a:solidFill>
+              <a:srgbClr val="FF0000"/>
+            </a:solidFill>
+          </a:ln>
+        </p:spPr>
+        <p:style>
+          <a:lnRef idx="1">
+            <a:schemeClr val="accent2"/>
+          </a:lnRef>
+          <a:fillRef idx="0">
+            <a:schemeClr val="accent2"/>
+          </a:fillRef>
+          <a:effectRef idx="0">
+            <a:schemeClr val="accent2"/>
+          </a:effectRef>
+          <a:fontRef idx="minor">
+            <a:schemeClr val="tx1"/>
+          </a:fontRef>
+        </p:style>
+      </p:cxnSp>
+      <p:cxnSp>
+        <p:nvCxnSpPr>
+          <p:cNvPr id="39" name="직선 연결선 38"/>
+          <p:cNvCxnSpPr/>
+          <p:nvPr/>
+        </p:nvCxnSpPr>
+        <p:spPr>
+          <a:xfrm flipV="1">
+            <a:off x="2494522" y="4101078"/>
+            <a:ext cx="216024" cy="144016"/>
+          </a:xfrm>
+          <a:prstGeom prst="line">
+            <a:avLst/>
+          </a:prstGeom>
+          <a:ln w="28575">
+            <a:solidFill>
+              <a:srgbClr val="FF0000"/>
+            </a:solidFill>
+          </a:ln>
+        </p:spPr>
+        <p:style>
+          <a:lnRef idx="1">
+            <a:schemeClr val="accent2"/>
+          </a:lnRef>
+          <a:fillRef idx="0">
+            <a:schemeClr val="accent2"/>
+          </a:fillRef>
+          <a:effectRef idx="0">
+            <a:schemeClr val="accent2"/>
+          </a:effectRef>
+          <a:fontRef idx="minor">
+            <a:schemeClr val="tx1"/>
+          </a:fontRef>
+        </p:style>
+      </p:cxnSp>
+      <p:cxnSp>
+        <p:nvCxnSpPr>
+          <p:cNvPr id="40" name="직선 연결선 39"/>
+          <p:cNvCxnSpPr/>
+          <p:nvPr/>
+        </p:nvCxnSpPr>
+        <p:spPr>
+          <a:xfrm>
+            <a:off x="2494524" y="4267921"/>
+            <a:ext cx="216024" cy="1"/>
+          </a:xfrm>
+          <a:prstGeom prst="line">
+            <a:avLst/>
+          </a:prstGeom>
+          <a:ln w="28575">
+            <a:solidFill>
+              <a:srgbClr val="FF0000"/>
+            </a:solidFill>
+          </a:ln>
+        </p:spPr>
+        <p:style>
+          <a:lnRef idx="1">
+            <a:schemeClr val="accent2"/>
+          </a:lnRef>
+          <a:fillRef idx="0">
+            <a:schemeClr val="accent2"/>
+          </a:fillRef>
+          <a:effectRef idx="0">
+            <a:schemeClr val="accent2"/>
+          </a:effectRef>
+          <a:fontRef idx="minor">
+            <a:schemeClr val="tx1"/>
+          </a:fontRef>
+        </p:style>
+      </p:cxnSp>
+      <p:sp>
+        <p:nvSpPr>
+          <p:cNvPr id="42" name="TextBox 41"/>
+          <p:cNvSpPr txBox="1"/>
+          <p:nvPr/>
+        </p:nvSpPr>
+        <p:spPr>
+          <a:xfrm>
+            <a:off x="5930684" y="3824079"/>
+            <a:ext cx="288032" cy="276999"/>
+          </a:xfrm>
+          <a:prstGeom prst="rect">
+            <a:avLst/>
+          </a:prstGeom>
+          <a:noFill/>
+        </p:spPr>
+        <p:txBody>
+          <a:bodyPr wrap="square" rtlCol="0">
+            <a:spAutoFit/>
+          </a:bodyPr>
+          <a:lstStyle/>
+          <a:p>
+            <a:r>
+              <a:rPr lang="en-US" altLang="ko-KR" sz="1200" dirty="0" smtClean="0"/>
+              <a:t>1</a:t>
+            </a:r>
+            <a:endParaRPr lang="ko-KR" altLang="en-US" sz="1200" dirty="0"/>
+          </a:p>
+        </p:txBody>
+      </p:sp>
+      <p:graphicFrame>
+        <p:nvGraphicFramePr>
+          <p:cNvPr id="43" name="표 42"/>
+          <p:cNvGraphicFramePr>
+            <a:graphicFrameLocks noGrp="1"/>
+          </p:cNvGraphicFramePr>
+          <p:nvPr>
+            <p:extLst>
+              <p:ext uri="{D42A27DB-BD31-4B8C-83A1-F6EECF244321}">
+                <p14:modId xmlns:p14="http://schemas.microsoft.com/office/powerpoint/2010/main" val="758130312"/>
+              </p:ext>
+            </p:extLst>
+          </p:nvPr>
+        </p:nvGraphicFramePr>
+        <p:xfrm>
+          <a:off x="6218716" y="3733920"/>
+          <a:ext cx="1440160" cy="1584176"/>
+        </p:xfrm>
+        <a:graphic>
+          <a:graphicData uri="http://schemas.openxmlformats.org/drawingml/2006/table">
+            <a:tbl>
+              <a:tblPr firstRow="1" bandRow="1">
+                <a:tableStyleId>{69012ECD-51FC-41F1-AA8D-1B2483CD663E}</a:tableStyleId>
+              </a:tblPr>
+              <a:tblGrid>
+                <a:gridCol w="1440160"/>
+              </a:tblGrid>
+              <a:tr h="216024">
+                <a:tc>
+                  <a:txBody>
+                    <a:bodyPr/>
+                    <a:lstStyle/>
+                    <a:p>
+                      <a:pPr algn="ctr" latinLnBrk="1"/>
+                      <a:r>
+                        <a:rPr lang="en-US" altLang="ko-KR" sz="1200" b="1" dirty="0" smtClean="0"/>
+                        <a:t>CATEGORYMGR</a:t>
+                      </a:r>
+                      <a:endParaRPr lang="ko-KR" altLang="en-US" sz="1200" dirty="0"/>
+                    </a:p>
+                  </a:txBody>
+                  <a:tcPr/>
+                </a:tc>
+              </a:tr>
+              <a:tr h="229736">
+                <a:tc>
+                  <a:txBody>
+                    <a:bodyPr/>
+                    <a:lstStyle/>
+                    <a:p>
+                      <a:pPr algn="just" latinLnBrk="1">
+                        <a:lnSpc>
+                          <a:spcPct val="115000"/>
+                        </a:lnSpc>
+                        <a:spcAft>
+                          <a:spcPts val="0"/>
+                        </a:spcAft>
+                      </a:pPr>
+                      <a:r>
+                        <a:rPr lang="en-US" altLang="ko-KR" sz="1000" dirty="0" smtClean="0"/>
+                        <a:t>CATEGORYNO</a:t>
+                      </a:r>
+                      <a:endParaRPr lang="ko-KR" sz="1000" kern="100" dirty="0">
+                        <a:effectLst/>
+                        <a:latin typeface="맑은 고딕"/>
+                        <a:ea typeface="맑은 고딕"/>
+                        <a:cs typeface="Times New Roman"/>
+                      </a:endParaRPr>
+                    </a:p>
+                  </a:txBody>
+                  <a:tcPr marL="68580" marR="68580" marT="0" marB="0">
+                    <a:solidFill>
+                      <a:srgbClr val="FFC000"/>
+                    </a:solidFill>
+                  </a:tcPr>
+                </a:tc>
+              </a:tr>
+              <a:tr h="216024">
+                <a:tc>
+                  <a:txBody>
+                    <a:bodyPr/>
+                    <a:lstStyle/>
+                    <a:p>
+                      <a:pPr algn="just" latinLnBrk="1">
+                        <a:lnSpc>
+                          <a:spcPct val="115000"/>
+                        </a:lnSpc>
+                        <a:spcAft>
+                          <a:spcPts val="0"/>
+                        </a:spcAft>
+                      </a:pPr>
+                      <a:r>
+                        <a:rPr lang="en-US" altLang="ko-KR" sz="1000" dirty="0" smtClean="0"/>
+                        <a:t>CATEGORY </a:t>
+                      </a:r>
+                      <a:endParaRPr lang="ko-KR" sz="1000" kern="100" dirty="0">
+                        <a:effectLst/>
+                        <a:latin typeface="맑은 고딕"/>
+                        <a:ea typeface="맑은 고딕"/>
+                        <a:cs typeface="Times New Roman"/>
+                      </a:endParaRPr>
+                    </a:p>
+                  </a:txBody>
+                  <a:tcPr marL="68580" marR="68580" marT="0" marB="0">
+                    <a:noFill/>
+                  </a:tcPr>
+                </a:tc>
+              </a:tr>
+              <a:tr h="216024">
+                <a:tc>
+                  <a:txBody>
+                    <a:bodyPr/>
+                    <a:lstStyle/>
+                    <a:p>
+                      <a:pPr algn="just" latinLnBrk="1">
+                        <a:lnSpc>
+                          <a:spcPct val="115000"/>
+                        </a:lnSpc>
+                        <a:spcAft>
+                          <a:spcPts val="0"/>
+                        </a:spcAft>
+                      </a:pPr>
+                      <a:r>
+                        <a:rPr lang="en-US" altLang="ko-KR" sz="1000" kern="100" dirty="0" smtClean="0">
+                          <a:effectLst/>
+                          <a:latin typeface="맑은 고딕"/>
+                          <a:ea typeface="맑은 고딕"/>
+                          <a:cs typeface="Times New Roman"/>
+                        </a:rPr>
+                        <a:t>CATTYPE</a:t>
+                      </a:r>
+                      <a:endParaRPr lang="ko-KR" sz="1000" kern="100" dirty="0">
+                        <a:effectLst/>
+                        <a:latin typeface="맑은 고딕"/>
+                        <a:ea typeface="맑은 고딕"/>
+                        <a:cs typeface="Times New Roman"/>
+                      </a:endParaRPr>
+                    </a:p>
+                  </a:txBody>
+                  <a:tcPr marL="68580" marR="68580" marT="0" marB="0">
+                    <a:solidFill>
+                      <a:schemeClr val="bg1"/>
+                    </a:solidFill>
+                  </a:tcPr>
+                </a:tc>
+              </a:tr>
+              <a:tr h="216024">
+                <a:tc>
+                  <a:txBody>
+                    <a:bodyPr/>
+                    <a:lstStyle/>
+                    <a:p>
+                      <a:pPr algn="just" latinLnBrk="1">
+                        <a:lnSpc>
+                          <a:spcPct val="115000"/>
+                        </a:lnSpc>
+                        <a:spcAft>
+                          <a:spcPts val="0"/>
+                        </a:spcAft>
+                      </a:pPr>
+                      <a:r>
+                        <a:rPr lang="en-US" altLang="ko-KR" sz="1000" kern="100" dirty="0" smtClean="0">
+                          <a:effectLst/>
+                          <a:latin typeface="맑은 고딕"/>
+                          <a:ea typeface="맑은 고딕"/>
+                          <a:cs typeface="Times New Roman"/>
+                        </a:rPr>
+                        <a:t>BUDGET</a:t>
+                      </a:r>
+                      <a:endParaRPr lang="ko-KR" sz="1000" kern="100" dirty="0">
+                        <a:effectLst/>
+                        <a:latin typeface="맑은 고딕"/>
+                        <a:ea typeface="맑은 고딕"/>
+                        <a:cs typeface="Times New Roman"/>
+                      </a:endParaRPr>
+                    </a:p>
+                  </a:txBody>
+                  <a:tcPr marL="68580" marR="68580" marT="0" marB="0">
+                    <a:solidFill>
+                      <a:schemeClr val="bg1"/>
+                    </a:solidFill>
+                  </a:tcPr>
+                </a:tc>
+              </a:tr>
+              <a:tr h="216024">
+                <a:tc>
+                  <a:txBody>
+                    <a:bodyPr/>
+                    <a:lstStyle/>
+                    <a:p>
+                      <a:pPr marL="0" marR="0" indent="0" algn="just" defTabSz="914400" rtl="0" eaLnBrk="1" fontAlgn="auto" latinLnBrk="1" hangingPunct="1">
+                        <a:lnSpc>
+                          <a:spcPct val="115000"/>
+                        </a:lnSpc>
+                        <a:spcBef>
+                          <a:spcPts val="0"/>
+                        </a:spcBef>
+                        <a:spcAft>
+                          <a:spcPts val="0"/>
+                        </a:spcAft>
+                        <a:buClrTx/>
+                        <a:buSzTx/>
+                        <a:buFontTx/>
+                        <a:buNone/>
+                        <a:tabLst/>
+                        <a:defRPr/>
+                      </a:pPr>
+                      <a:r>
+                        <a:rPr lang="en-US" altLang="ko-KR" sz="1000" kern="100" dirty="0" smtClean="0">
+                          <a:effectLst/>
+                          <a:latin typeface="+mn-lt"/>
+                          <a:ea typeface="+mn-ea"/>
+                          <a:cs typeface="Times New Roman"/>
+                        </a:rPr>
+                        <a:t>BALANCE</a:t>
+                      </a:r>
+                      <a:endParaRPr lang="ko-KR" altLang="ko-KR" sz="1000" kern="100" dirty="0">
+                        <a:effectLst/>
+                        <a:latin typeface="+mn-lt"/>
+                        <a:ea typeface="+mn-ea"/>
+                        <a:cs typeface="Times New Roman"/>
+                      </a:endParaRPr>
+                    </a:p>
+                  </a:txBody>
+                  <a:tcPr marL="68580" marR="68580" marT="0" marB="0">
+                    <a:solidFill>
+                      <a:schemeClr val="bg1"/>
+                    </a:solidFill>
+                  </a:tcPr>
+                </a:tc>
+              </a:tr>
+              <a:tr h="216024">
+                <a:tc>
+                  <a:txBody>
+                    <a:bodyPr/>
+                    <a:lstStyle/>
+                    <a:p>
+                      <a:pPr marL="0" marR="0" indent="0" algn="just" defTabSz="914400" rtl="0" eaLnBrk="1" fontAlgn="auto" latinLnBrk="1" hangingPunct="1">
+                        <a:lnSpc>
+                          <a:spcPct val="115000"/>
+                        </a:lnSpc>
+                        <a:spcBef>
+                          <a:spcPts val="0"/>
+                        </a:spcBef>
+                        <a:spcAft>
+                          <a:spcPts val="0"/>
+                        </a:spcAft>
+                        <a:buClrTx/>
+                        <a:buSzTx/>
+                        <a:buFontTx/>
+                        <a:buNone/>
+                        <a:tabLst/>
+                        <a:defRPr/>
+                      </a:pPr>
+                      <a:r>
+                        <a:rPr lang="en-US" altLang="ko-KR" sz="1000" kern="100" dirty="0" smtClean="0">
+                          <a:effectLst/>
+                          <a:latin typeface="+mn-lt"/>
+                          <a:ea typeface="+mn-ea"/>
+                          <a:cs typeface="Times New Roman"/>
+                        </a:rPr>
+                        <a:t>USER_NO</a:t>
+                      </a:r>
+                      <a:endParaRPr lang="ko-KR" altLang="ko-KR" sz="1000" kern="100" dirty="0">
+                        <a:effectLst/>
+                        <a:latin typeface="+mn-lt"/>
+                        <a:ea typeface="+mn-ea"/>
+                        <a:cs typeface="Times New Roman"/>
+                      </a:endParaRPr>
+                    </a:p>
+                  </a:txBody>
+                  <a:tcPr marL="68580" marR="68580" marT="0" marB="0">
+                    <a:solidFill>
+                      <a:srgbClr val="FFC000"/>
+                    </a:solidFill>
+                  </a:tcPr>
+                </a:tc>
+              </a:tr>
+            </a:tbl>
+          </a:graphicData>
+        </a:graphic>
+      </p:graphicFrame>
+      <p:cxnSp>
+        <p:nvCxnSpPr>
+          <p:cNvPr id="46" name="꺾인 연결선 45"/>
+          <p:cNvCxnSpPr/>
+          <p:nvPr/>
+        </p:nvCxnSpPr>
+        <p:spPr>
+          <a:xfrm>
+            <a:off x="4150280" y="2821474"/>
+            <a:ext cx="2066651" cy="1238326"/>
+          </a:xfrm>
+          <a:prstGeom prst="bentConnector3">
+            <a:avLst>
+              <a:gd name="adj1" fmla="val 50000"/>
+            </a:avLst>
+          </a:prstGeom>
+          <a:ln w="28575">
+            <a:solidFill>
+              <a:srgbClr val="FF0000"/>
+            </a:solidFill>
+          </a:ln>
+        </p:spPr>
+        <p:style>
+          <a:lnRef idx="1">
+            <a:schemeClr val="accent1"/>
+          </a:lnRef>
+          <a:fillRef idx="0">
+            <a:schemeClr val="accent1"/>
+          </a:fillRef>
+          <a:effectRef idx="0">
+            <a:schemeClr val="accent1"/>
+          </a:effectRef>
+          <a:fontRef idx="minor">
+            <a:schemeClr val="tx1"/>
+          </a:fontRef>
+        </p:style>
+      </p:cxnSp>
+      <p:cxnSp>
+        <p:nvCxnSpPr>
+          <p:cNvPr id="47" name="직선 연결선 46"/>
+          <p:cNvCxnSpPr/>
+          <p:nvPr/>
+        </p:nvCxnSpPr>
+        <p:spPr>
+          <a:xfrm>
+            <a:off x="4175954" y="2681257"/>
+            <a:ext cx="216024" cy="135632"/>
+          </a:xfrm>
+          <a:prstGeom prst="line">
+            <a:avLst/>
+          </a:prstGeom>
+          <a:ln w="28575">
+            <a:solidFill>
+              <a:srgbClr val="FF0000"/>
+            </a:solidFill>
+          </a:ln>
+        </p:spPr>
+        <p:style>
+          <a:lnRef idx="1">
+            <a:schemeClr val="accent2"/>
+          </a:lnRef>
+          <a:fillRef idx="0">
+            <a:schemeClr val="accent2"/>
+          </a:fillRef>
+          <a:effectRef idx="0">
+            <a:schemeClr val="accent2"/>
+          </a:effectRef>
+          <a:fontRef idx="minor">
+            <a:schemeClr val="tx1"/>
+          </a:fontRef>
+        </p:style>
+      </p:cxnSp>
+      <p:cxnSp>
+        <p:nvCxnSpPr>
+          <p:cNvPr id="48" name="직선 연결선 47"/>
+          <p:cNvCxnSpPr/>
+          <p:nvPr/>
+        </p:nvCxnSpPr>
+        <p:spPr>
+          <a:xfrm flipV="1">
+            <a:off x="4150280" y="2569096"/>
+            <a:ext cx="216024" cy="144016"/>
+          </a:xfrm>
+          <a:prstGeom prst="line">
+            <a:avLst/>
+          </a:prstGeom>
+          <a:ln w="28575">
+            <a:solidFill>
+              <a:srgbClr val="FF0000"/>
+            </a:solidFill>
+          </a:ln>
+        </p:spPr>
+        <p:style>
+          <a:lnRef idx="1">
+            <a:schemeClr val="accent2"/>
+          </a:lnRef>
+          <a:fillRef idx="0">
+            <a:schemeClr val="accent2"/>
+          </a:fillRef>
+          <a:effectRef idx="0">
+            <a:schemeClr val="accent2"/>
+          </a:effectRef>
+          <a:fontRef idx="minor">
+            <a:schemeClr val="tx1"/>
+          </a:fontRef>
+        </p:style>
+      </p:cxnSp>
+      <p:sp>
+        <p:nvSpPr>
+          <p:cNvPr id="50" name="TextBox 49"/>
+          <p:cNvSpPr txBox="1"/>
+          <p:nvPr/>
+        </p:nvSpPr>
+        <p:spPr>
+          <a:xfrm>
+            <a:off x="5930684" y="4173086"/>
+            <a:ext cx="288032" cy="276999"/>
+          </a:xfrm>
+          <a:prstGeom prst="rect">
+            <a:avLst/>
+          </a:prstGeom>
+          <a:noFill/>
+        </p:spPr>
+        <p:txBody>
+          <a:bodyPr wrap="square" rtlCol="0">
+            <a:spAutoFit/>
+          </a:bodyPr>
+          <a:lstStyle/>
+          <a:p>
+            <a:r>
+              <a:rPr lang="en-US" altLang="ko-KR" sz="1200" dirty="0" smtClean="0"/>
+              <a:t>1</a:t>
+            </a:r>
+            <a:endParaRPr lang="ko-KR" altLang="en-US" sz="1200" dirty="0"/>
+          </a:p>
+        </p:txBody>
+      </p:sp>
+      <p:sp>
+        <p:nvSpPr>
+          <p:cNvPr id="51" name="TextBox 50"/>
+          <p:cNvSpPr txBox="1"/>
+          <p:nvPr/>
+        </p:nvSpPr>
+        <p:spPr>
+          <a:xfrm>
+            <a:off x="5951495" y="2472074"/>
+            <a:ext cx="288032" cy="276999"/>
+          </a:xfrm>
+          <a:prstGeom prst="rect">
+            <a:avLst/>
+          </a:prstGeom>
+          <a:noFill/>
+        </p:spPr>
+        <p:txBody>
+          <a:bodyPr wrap="square" rtlCol="0">
+            <a:spAutoFit/>
+          </a:bodyPr>
+          <a:lstStyle/>
+          <a:p>
+            <a:r>
+              <a:rPr lang="en-US" altLang="ko-KR" sz="1200" dirty="0" smtClean="0"/>
+              <a:t>1</a:t>
+            </a:r>
+            <a:endParaRPr lang="ko-KR" altLang="en-US" sz="1200" dirty="0"/>
+          </a:p>
+        </p:txBody>
+      </p:sp>
+      <p:cxnSp>
+        <p:nvCxnSpPr>
+          <p:cNvPr id="52" name="꺾인 연결선 51"/>
+          <p:cNvCxnSpPr/>
+          <p:nvPr/>
+        </p:nvCxnSpPr>
+        <p:spPr>
+          <a:xfrm rot="5400000" flipH="1" flipV="1">
+            <a:off x="4087534" y="2988396"/>
+            <a:ext cx="2877153" cy="1476168"/>
+          </a:xfrm>
+          <a:prstGeom prst="bentConnector3">
+            <a:avLst>
+              <a:gd name="adj1" fmla="val 99658"/>
+            </a:avLst>
+          </a:prstGeom>
+          <a:ln w="28575">
+            <a:solidFill>
+              <a:srgbClr val="FF0000"/>
+            </a:solidFill>
+          </a:ln>
+        </p:spPr>
+        <p:style>
+          <a:lnRef idx="1">
+            <a:schemeClr val="accent1"/>
+          </a:lnRef>
+          <a:fillRef idx="0">
+            <a:schemeClr val="accent1"/>
+          </a:fillRef>
+          <a:effectRef idx="0">
+            <a:schemeClr val="accent1"/>
+          </a:effectRef>
+          <a:fontRef idx="minor">
+            <a:schemeClr val="tx1"/>
+          </a:fontRef>
+        </p:style>
+      </p:cxnSp>
+      <p:cxnSp>
+        <p:nvCxnSpPr>
+          <p:cNvPr id="53" name="직선 연결선 52"/>
+          <p:cNvCxnSpPr/>
+          <p:nvPr/>
+        </p:nvCxnSpPr>
+        <p:spPr>
+          <a:xfrm>
+            <a:off x="4175601" y="5013176"/>
+            <a:ext cx="216024" cy="135632"/>
+          </a:xfrm>
+          <a:prstGeom prst="line">
+            <a:avLst/>
+          </a:prstGeom>
+          <a:ln w="28575">
+            <a:solidFill>
+              <a:srgbClr val="FF0000"/>
+            </a:solidFill>
+          </a:ln>
+        </p:spPr>
+        <p:style>
+          <a:lnRef idx="1">
+            <a:schemeClr val="accent2"/>
+          </a:lnRef>
+          <a:fillRef idx="0">
+            <a:schemeClr val="accent2"/>
+          </a:fillRef>
+          <a:effectRef idx="0">
+            <a:schemeClr val="accent2"/>
+          </a:effectRef>
+          <a:fontRef idx="minor">
+            <a:schemeClr val="tx1"/>
+          </a:fontRef>
+        </p:style>
+      </p:cxnSp>
+      <p:cxnSp>
+        <p:nvCxnSpPr>
+          <p:cNvPr id="54" name="직선 연결선 53"/>
+          <p:cNvCxnSpPr/>
+          <p:nvPr/>
+        </p:nvCxnSpPr>
+        <p:spPr>
+          <a:xfrm flipV="1">
+            <a:off x="4175601" y="5165056"/>
+            <a:ext cx="216024" cy="144016"/>
+          </a:xfrm>
+          <a:prstGeom prst="line">
+            <a:avLst/>
+          </a:prstGeom>
+          <a:ln w="28575">
+            <a:solidFill>
+              <a:srgbClr val="FF0000"/>
+            </a:solidFill>
+          </a:ln>
+        </p:spPr>
+        <p:style>
+          <a:lnRef idx="1">
+            <a:schemeClr val="accent2"/>
+          </a:lnRef>
+          <a:fillRef idx="0">
+            <a:schemeClr val="accent2"/>
+          </a:fillRef>
+          <a:effectRef idx="0">
+            <a:schemeClr val="accent2"/>
+          </a:effectRef>
+          <a:fontRef idx="minor">
+            <a:schemeClr val="tx1"/>
+          </a:fontRef>
+        </p:style>
+      </p:cxnSp>
+      <p:cxnSp>
+        <p:nvCxnSpPr>
+          <p:cNvPr id="65" name="직선 연결선 64"/>
+          <p:cNvCxnSpPr/>
+          <p:nvPr/>
+        </p:nvCxnSpPr>
+        <p:spPr>
+          <a:xfrm>
+            <a:off x="4150280" y="5148808"/>
+            <a:ext cx="637746" cy="0"/>
+          </a:xfrm>
+          <a:prstGeom prst="line">
+            <a:avLst/>
+          </a:prstGeom>
+          <a:ln w="28575">
+            <a:solidFill>
+              <a:srgbClr val="FF0000"/>
+            </a:solidFill>
+          </a:ln>
+        </p:spPr>
+        <p:style>
+          <a:lnRef idx="1">
+            <a:schemeClr val="accent2"/>
+          </a:lnRef>
+          <a:fillRef idx="0">
+            <a:schemeClr val="accent2"/>
+          </a:fillRef>
+          <a:effectRef idx="0">
+            <a:schemeClr val="accent2"/>
+          </a:effectRef>
+          <a:fontRef idx="minor">
+            <a:schemeClr val="tx1"/>
+          </a:fontRef>
+        </p:style>
+      </p:cxnSp>
+      <p:sp>
+        <p:nvSpPr>
+          <p:cNvPr id="67" name="TextBox 66"/>
+          <p:cNvSpPr txBox="1"/>
+          <p:nvPr/>
+        </p:nvSpPr>
+        <p:spPr>
+          <a:xfrm>
+            <a:off x="4328204" y="4855957"/>
+            <a:ext cx="288032" cy="276999"/>
+          </a:xfrm>
+          <a:prstGeom prst="rect">
+            <a:avLst/>
+          </a:prstGeom>
+          <a:noFill/>
+        </p:spPr>
+        <p:txBody>
+          <a:bodyPr wrap="square" rtlCol="0">
+            <a:spAutoFit/>
+          </a:bodyPr>
+          <a:lstStyle/>
+          <a:p>
+            <a:r>
+              <a:rPr lang="en-US" altLang="ko-KR" sz="1200" dirty="0" smtClean="0"/>
+              <a:t>N</a:t>
+            </a:r>
+            <a:endParaRPr lang="ko-KR" altLang="en-US" sz="1200" dirty="0"/>
+          </a:p>
+        </p:txBody>
+      </p:sp>
+      <p:sp>
+        <p:nvSpPr>
+          <p:cNvPr id="68" name="TextBox 67"/>
+          <p:cNvSpPr txBox="1"/>
+          <p:nvPr/>
+        </p:nvSpPr>
+        <p:spPr>
+          <a:xfrm>
+            <a:off x="4299274" y="5528364"/>
+            <a:ext cx="288032" cy="276999"/>
+          </a:xfrm>
+          <a:prstGeom prst="rect">
+            <a:avLst/>
+          </a:prstGeom>
+          <a:noFill/>
+        </p:spPr>
+        <p:txBody>
+          <a:bodyPr wrap="square" rtlCol="0">
+            <a:spAutoFit/>
+          </a:bodyPr>
+          <a:lstStyle/>
+          <a:p>
+            <a:r>
+              <a:rPr lang="en-US" altLang="ko-KR" sz="1200" dirty="0" smtClean="0"/>
+              <a:t>N</a:t>
+            </a:r>
+            <a:endParaRPr lang="ko-KR" altLang="en-US" sz="1200" dirty="0"/>
+          </a:p>
+        </p:txBody>
+      </p:sp>
+      <p:cxnSp>
+        <p:nvCxnSpPr>
+          <p:cNvPr id="71" name="꺾인 연결선 70"/>
+          <p:cNvCxnSpPr>
+            <a:stCxn id="3" idx="0"/>
+            <a:endCxn id="19" idx="0"/>
+          </p:cNvCxnSpPr>
+          <p:nvPr/>
+        </p:nvCxnSpPr>
+        <p:spPr>
+          <a:xfrm rot="5400000" flipH="1" flipV="1">
+            <a:off x="3885375" y="-670553"/>
+            <a:ext cx="617165" cy="5580618"/>
+          </a:xfrm>
+          <a:prstGeom prst="bentConnector3">
+            <a:avLst>
+              <a:gd name="adj1" fmla="val 200317"/>
+            </a:avLst>
+          </a:prstGeom>
+          <a:ln w="28575">
+            <a:solidFill>
+              <a:srgbClr val="FF0000"/>
+            </a:solidFill>
+          </a:ln>
+        </p:spPr>
+        <p:style>
+          <a:lnRef idx="1">
+            <a:schemeClr val="accent1"/>
+          </a:lnRef>
+          <a:fillRef idx="0">
+            <a:schemeClr val="accent1"/>
+          </a:fillRef>
+          <a:effectRef idx="0">
+            <a:schemeClr val="accent1"/>
+          </a:effectRef>
+          <a:fontRef idx="minor">
+            <a:schemeClr val="tx1"/>
+          </a:fontRef>
+        </p:style>
+      </p:cxnSp>
+      <p:cxnSp>
+        <p:nvCxnSpPr>
+          <p:cNvPr id="78" name="직선 연결선 77"/>
+          <p:cNvCxnSpPr/>
+          <p:nvPr/>
+        </p:nvCxnSpPr>
+        <p:spPr>
+          <a:xfrm>
+            <a:off x="1403650" y="2258446"/>
+            <a:ext cx="216024" cy="135632"/>
+          </a:xfrm>
+          <a:prstGeom prst="line">
+            <a:avLst/>
+          </a:prstGeom>
+          <a:ln w="28575">
+            <a:solidFill>
+              <a:srgbClr val="FF0000"/>
+            </a:solidFill>
+          </a:ln>
+        </p:spPr>
+        <p:style>
+          <a:lnRef idx="1">
+            <a:schemeClr val="accent2"/>
+          </a:lnRef>
+          <a:fillRef idx="0">
+            <a:schemeClr val="accent2"/>
+          </a:fillRef>
+          <a:effectRef idx="0">
+            <a:schemeClr val="accent2"/>
+          </a:effectRef>
+          <a:fontRef idx="minor">
+            <a:schemeClr val="tx1"/>
+          </a:fontRef>
+        </p:style>
+      </p:cxnSp>
+      <p:cxnSp>
+        <p:nvCxnSpPr>
+          <p:cNvPr id="79" name="직선 연결선 78"/>
+          <p:cNvCxnSpPr/>
+          <p:nvPr/>
+        </p:nvCxnSpPr>
+        <p:spPr>
+          <a:xfrm flipV="1">
+            <a:off x="1187624" y="2240869"/>
+            <a:ext cx="216024" cy="144016"/>
+          </a:xfrm>
+          <a:prstGeom prst="line">
+            <a:avLst/>
+          </a:prstGeom>
+          <a:ln w="28575">
+            <a:solidFill>
+              <a:srgbClr val="FF0000"/>
+            </a:solidFill>
+          </a:ln>
+        </p:spPr>
+        <p:style>
+          <a:lnRef idx="1">
+            <a:schemeClr val="accent2"/>
+          </a:lnRef>
+          <a:fillRef idx="0">
+            <a:schemeClr val="accent2"/>
+          </a:fillRef>
+          <a:effectRef idx="0">
+            <a:schemeClr val="accent2"/>
+          </a:effectRef>
+          <a:fontRef idx="minor">
+            <a:schemeClr val="tx1"/>
+          </a:fontRef>
+        </p:style>
+      </p:cxnSp>
+      <p:sp>
+        <p:nvSpPr>
+          <p:cNvPr id="80" name="TextBox 79"/>
+          <p:cNvSpPr txBox="1"/>
+          <p:nvPr/>
+        </p:nvSpPr>
+        <p:spPr>
+          <a:xfrm>
+            <a:off x="1043608" y="2040463"/>
+            <a:ext cx="288032" cy="276999"/>
+          </a:xfrm>
+          <a:prstGeom prst="rect">
+            <a:avLst/>
+          </a:prstGeom>
+          <a:noFill/>
+        </p:spPr>
+        <p:txBody>
+          <a:bodyPr wrap="square" rtlCol="0">
+            <a:spAutoFit/>
+          </a:bodyPr>
+          <a:lstStyle/>
+          <a:p>
+            <a:r>
+              <a:rPr lang="en-US" altLang="ko-KR" sz="1200" dirty="0" smtClean="0"/>
+              <a:t>1</a:t>
+            </a:r>
+            <a:endParaRPr lang="ko-KR" altLang="en-US" sz="1200" dirty="0"/>
+          </a:p>
+        </p:txBody>
+      </p:sp>
+      <p:sp>
+        <p:nvSpPr>
+          <p:cNvPr id="81" name="TextBox 80"/>
+          <p:cNvSpPr txBox="1"/>
+          <p:nvPr/>
+        </p:nvSpPr>
+        <p:spPr>
+          <a:xfrm>
+            <a:off x="6984267" y="1495817"/>
+            <a:ext cx="288032" cy="276999"/>
+          </a:xfrm>
+          <a:prstGeom prst="rect">
+            <a:avLst/>
+          </a:prstGeom>
+          <a:noFill/>
+        </p:spPr>
+        <p:txBody>
+          <a:bodyPr wrap="square" rtlCol="0">
+            <a:spAutoFit/>
+          </a:bodyPr>
+          <a:lstStyle/>
+          <a:p>
+            <a:r>
+              <a:rPr lang="en-US" altLang="ko-KR" sz="1200" dirty="0" smtClean="0"/>
+              <a:t>1</a:t>
+            </a:r>
+            <a:endParaRPr lang="ko-KR" altLang="en-US" sz="1200" dirty="0"/>
+          </a:p>
+        </p:txBody>
+      </p:sp>
+      <p:cxnSp>
+        <p:nvCxnSpPr>
+          <p:cNvPr id="86" name="꺾인 연결선 85"/>
+          <p:cNvCxnSpPr>
+            <a:stCxn id="3" idx="2"/>
+          </p:cNvCxnSpPr>
+          <p:nvPr/>
+        </p:nvCxnSpPr>
+        <p:spPr>
+          <a:xfrm rot="16200000" flipH="1">
+            <a:off x="3592766" y="2471468"/>
+            <a:ext cx="1163513" cy="5541748"/>
+          </a:xfrm>
+          <a:prstGeom prst="bentConnector2">
+            <a:avLst/>
+          </a:prstGeom>
+          <a:ln w="28575">
+            <a:solidFill>
+              <a:srgbClr val="FF0000"/>
+            </a:solidFill>
+          </a:ln>
+        </p:spPr>
+        <p:style>
+          <a:lnRef idx="1">
+            <a:schemeClr val="accent1"/>
+          </a:lnRef>
+          <a:fillRef idx="0">
+            <a:schemeClr val="accent1"/>
+          </a:fillRef>
+          <a:effectRef idx="0">
+            <a:schemeClr val="accent1"/>
+          </a:effectRef>
+          <a:fontRef idx="minor">
+            <a:schemeClr val="tx1"/>
+          </a:fontRef>
+        </p:style>
+      </p:cxnSp>
+      <p:cxnSp>
+        <p:nvCxnSpPr>
+          <p:cNvPr id="89" name="직선 연결선 88"/>
+          <p:cNvCxnSpPr>
+            <a:stCxn id="43" idx="2"/>
+          </p:cNvCxnSpPr>
+          <p:nvPr/>
+        </p:nvCxnSpPr>
+        <p:spPr>
+          <a:xfrm>
+            <a:off x="6938796" y="5318096"/>
+            <a:ext cx="6601" cy="506003"/>
+          </a:xfrm>
+          <a:prstGeom prst="line">
+            <a:avLst/>
+          </a:prstGeom>
+          <a:ln w="28575">
+            <a:solidFill>
+              <a:srgbClr val="FF0000"/>
+            </a:solidFill>
+          </a:ln>
+        </p:spPr>
+        <p:style>
+          <a:lnRef idx="1">
+            <a:schemeClr val="accent2"/>
+          </a:lnRef>
+          <a:fillRef idx="0">
+            <a:schemeClr val="accent2"/>
+          </a:fillRef>
+          <a:effectRef idx="0">
+            <a:schemeClr val="accent2"/>
+          </a:effectRef>
+          <a:fontRef idx="minor">
+            <a:schemeClr val="tx1"/>
+          </a:fontRef>
+        </p:style>
+      </p:cxnSp>
+      <p:sp>
+        <p:nvSpPr>
+          <p:cNvPr id="92" name="TextBox 91"/>
+          <p:cNvSpPr txBox="1"/>
+          <p:nvPr/>
+        </p:nvSpPr>
+        <p:spPr>
+          <a:xfrm>
+            <a:off x="6984267" y="5312633"/>
+            <a:ext cx="288032" cy="276999"/>
+          </a:xfrm>
+          <a:prstGeom prst="rect">
+            <a:avLst/>
+          </a:prstGeom>
+          <a:noFill/>
+        </p:spPr>
+        <p:txBody>
+          <a:bodyPr wrap="square" rtlCol="0">
+            <a:spAutoFit/>
+          </a:bodyPr>
+          <a:lstStyle/>
+          <a:p>
+            <a:r>
+              <a:rPr lang="en-US" altLang="ko-KR" sz="1200" dirty="0" smtClean="0"/>
+              <a:t>1</a:t>
+            </a:r>
+            <a:endParaRPr lang="ko-KR" altLang="en-US" sz="1200" dirty="0"/>
+          </a:p>
+        </p:txBody>
+      </p:sp>
+      <p:sp>
+        <p:nvSpPr>
+          <p:cNvPr id="93" name="TextBox 92"/>
+          <p:cNvSpPr txBox="1"/>
+          <p:nvPr/>
+        </p:nvSpPr>
+        <p:spPr>
+          <a:xfrm>
+            <a:off x="1439044" y="4664232"/>
+            <a:ext cx="288032" cy="276999"/>
+          </a:xfrm>
+          <a:prstGeom prst="rect">
+            <a:avLst/>
+          </a:prstGeom>
+          <a:noFill/>
+        </p:spPr>
+        <p:txBody>
+          <a:bodyPr wrap="square" rtlCol="0">
+            <a:spAutoFit/>
+          </a:bodyPr>
+          <a:lstStyle/>
+          <a:p>
+            <a:r>
+              <a:rPr lang="en-US" altLang="ko-KR" sz="1200" dirty="0" smtClean="0"/>
+              <a:t>1</a:t>
+            </a:r>
+            <a:endParaRPr lang="ko-KR" altLang="en-US" sz="1200" dirty="0"/>
+          </a:p>
+        </p:txBody>
+      </p:sp>
     </p:spTree>
     <p:extLst>
       <p:ext uri="{BB962C8B-B14F-4D97-AF65-F5344CB8AC3E}">
         <p14:creationId xmlns:p14="http://schemas.microsoft.com/office/powerpoint/2010/main" val="1026706713"/>
+      </p:ext>
+    </p:extLst>
+  </p:cSld>
+  <p:clrMapOvr>
+    <a:masterClrMapping/>
+  </p:clrMapOvr>
+</p:sld>
+</file>
+
+<file path=ppt/slides/slide7.xml><?xml version="1.0" encoding="utf-8"?>
+<p:sld xmlns:a="http://schemas.openxmlformats.org/drawingml/2006/main" xmlns:r="http://schemas.openxmlformats.org/officeDocument/2006/relationships" xmlns:p="http://schemas.openxmlformats.org/presentationml/2006/main">
+  <p:cSld>
+    <p:spTree>
+      <p:nvGrpSpPr>
+        <p:cNvPr id="1" name=""/>
+        <p:cNvGrpSpPr/>
+        <p:nvPr/>
+      </p:nvGrpSpPr>
+      <p:grpSpPr>
+        <a:xfrm>
+          <a:off x="0" y="0"/>
+          <a:ext cx="0" cy="0"/>
+          <a:chOff x="0" y="0"/>
+          <a:chExt cx="0" cy="0"/>
+        </a:xfrm>
+      </p:grpSpPr>
+      <p:sp>
+        <p:nvSpPr>
+          <p:cNvPr id="2" name="텍스트 개체 틀 1"/>
+          <p:cNvSpPr>
+            <a:spLocks noGrp="1"/>
+          </p:cNvSpPr>
+          <p:nvPr>
+            <p:ph type="body" sz="quarter" idx="10"/>
+          </p:nvPr>
+        </p:nvSpPr>
+        <p:spPr/>
+        <p:txBody>
+          <a:bodyPr/>
+          <a:lstStyle/>
+          <a:p>
+            <a:pPr>
+              <a:buFont typeface="+mj-lt"/>
+              <a:buAutoNum type="arabicPeriod" startAt="3"/>
+            </a:pPr>
+            <a:r>
+              <a:rPr lang="en-US" altLang="ko-KR" dirty="0" smtClean="0"/>
+              <a:t>DB </a:t>
+            </a:r>
+            <a:r>
+              <a:rPr lang="ko-KR" altLang="en-US" dirty="0" smtClean="0"/>
+              <a:t>구성 </a:t>
+            </a:r>
+            <a:r>
+              <a:rPr lang="en-US" altLang="ko-KR" dirty="0" smtClean="0"/>
+              <a:t>- REGISTER</a:t>
+            </a:r>
+            <a:endParaRPr lang="ko-KR" altLang="en-US" dirty="0"/>
+          </a:p>
+        </p:txBody>
+      </p:sp>
+      <p:sp>
+        <p:nvSpPr>
+          <p:cNvPr id="13" name="직사각형 12"/>
+          <p:cNvSpPr/>
+          <p:nvPr/>
+        </p:nvSpPr>
+        <p:spPr>
+          <a:xfrm>
+            <a:off x="284336" y="980728"/>
+            <a:ext cx="4268067" cy="3323987"/>
+          </a:xfrm>
+          <a:prstGeom prst="rect">
+            <a:avLst/>
+          </a:prstGeom>
+        </p:spPr>
+        <p:txBody>
+          <a:bodyPr wrap="square">
+            <a:spAutoFit/>
+          </a:bodyPr>
+          <a:lstStyle/>
+          <a:p>
+            <a:pPr marL="285750" indent="-285750">
+              <a:buFont typeface="Arial" pitchFamily="34" charset="0"/>
+              <a:buChar char="•"/>
+            </a:pPr>
+            <a:r>
+              <a:rPr lang="ko-KR" altLang="en-US" sz="1400" b="1" dirty="0" smtClean="0"/>
+              <a:t>회원가입</a:t>
+            </a:r>
+            <a:endParaRPr lang="en-US" altLang="ko-KR" sz="1400" b="1" dirty="0" smtClean="0"/>
+          </a:p>
+          <a:p>
+            <a:endParaRPr lang="en-US" altLang="ko-KR" sz="1400" b="1" dirty="0"/>
+          </a:p>
+          <a:p>
+            <a:pPr lvl="1"/>
+            <a:r>
+              <a:rPr lang="en-US" altLang="ko-KR" sz="1400" dirty="0" smtClean="0"/>
+              <a:t>CREATE </a:t>
+            </a:r>
+            <a:r>
+              <a:rPr lang="en-US" altLang="ko-KR" sz="1400" dirty="0"/>
+              <a:t>TABLE REGISTER</a:t>
+            </a:r>
+          </a:p>
+          <a:p>
+            <a:pPr lvl="1"/>
+            <a:r>
+              <a:rPr lang="en-US" altLang="ko-KR" sz="1400" dirty="0"/>
+              <a:t>(</a:t>
+            </a:r>
+          </a:p>
+          <a:p>
+            <a:pPr lvl="1"/>
+            <a:r>
+              <a:rPr lang="en-US" altLang="ko-KR" sz="1400" dirty="0"/>
+              <a:t>USER_NO NUMBER,</a:t>
+            </a:r>
+          </a:p>
+          <a:p>
+            <a:pPr lvl="1"/>
+            <a:r>
+              <a:rPr lang="en-US" altLang="ko-KR" sz="1400" dirty="0"/>
+              <a:t>ACCID VARCHAR2(15),</a:t>
+            </a:r>
+          </a:p>
+          <a:p>
+            <a:pPr lvl="1"/>
+            <a:r>
+              <a:rPr lang="en-US" altLang="ko-KR" sz="1400" dirty="0"/>
+              <a:t>PASSWORD VARCHAR2(20), </a:t>
+            </a:r>
+          </a:p>
+          <a:p>
+            <a:pPr lvl="1"/>
+            <a:r>
+              <a:rPr lang="en-US" altLang="ko-KR" sz="1400" dirty="0"/>
+              <a:t>NAME VARCHAR2(15),</a:t>
+            </a:r>
+          </a:p>
+          <a:p>
+            <a:pPr lvl="1"/>
+            <a:r>
+              <a:rPr lang="en-US" altLang="ko-KR" sz="1400" dirty="0"/>
+              <a:t>AGE NUMBER,</a:t>
+            </a:r>
+          </a:p>
+          <a:p>
+            <a:pPr lvl="1"/>
+            <a:r>
+              <a:rPr lang="en-US" altLang="ko-KR" sz="1400" dirty="0"/>
+              <a:t>GENDER VARCHAR2(5),</a:t>
+            </a:r>
+          </a:p>
+          <a:p>
+            <a:pPr lvl="1"/>
+            <a:r>
+              <a:rPr lang="en-US" altLang="ko-KR" sz="1400" dirty="0"/>
+              <a:t>EMAIL VARCHAR2(30),</a:t>
+            </a:r>
+          </a:p>
+          <a:p>
+            <a:pPr lvl="1"/>
+            <a:r>
+              <a:rPr lang="en-US" altLang="ko-KR" sz="1400" dirty="0"/>
+              <a:t>REGDATE DATE,</a:t>
+            </a:r>
+          </a:p>
+          <a:p>
+            <a:pPr lvl="1"/>
+            <a:r>
+              <a:rPr lang="en-US" altLang="ko-KR" sz="1400" dirty="0"/>
+              <a:t>PRIMARY KEY(USER_NO)</a:t>
+            </a:r>
+          </a:p>
+          <a:p>
+            <a:pPr lvl="1"/>
+            <a:r>
+              <a:rPr lang="en-US" altLang="ko-KR" sz="1400" dirty="0" smtClean="0"/>
+              <a:t>)</a:t>
+            </a:r>
+          </a:p>
+          <a:p>
+            <a:endParaRPr lang="en-US" altLang="ko-KR" sz="1400" dirty="0" smtClean="0"/>
+          </a:p>
+        </p:txBody>
+      </p:sp>
+      <p:sp>
+        <p:nvSpPr>
+          <p:cNvPr id="21" name="직사각형 20"/>
+          <p:cNvSpPr/>
+          <p:nvPr/>
+        </p:nvSpPr>
+        <p:spPr>
+          <a:xfrm>
+            <a:off x="4572000" y="980728"/>
+            <a:ext cx="4572000" cy="1384995"/>
+          </a:xfrm>
+          <a:prstGeom prst="rect">
+            <a:avLst/>
+          </a:prstGeom>
+        </p:spPr>
+        <p:txBody>
+          <a:bodyPr>
+            <a:spAutoFit/>
+          </a:bodyPr>
+          <a:lstStyle/>
+          <a:p>
+            <a:pPr marL="285750" indent="-285750">
+              <a:buFont typeface="Arial" pitchFamily="34" charset="0"/>
+              <a:buChar char="•"/>
+            </a:pPr>
+            <a:r>
+              <a:rPr lang="ko-KR" altLang="en-US" sz="1400" b="1" dirty="0"/>
+              <a:t>제약조건 추가</a:t>
+            </a:r>
+            <a:endParaRPr lang="en-US" altLang="ko-KR" sz="1400" b="1" dirty="0"/>
+          </a:p>
+          <a:p>
+            <a:endParaRPr lang="en-US" altLang="ko-KR" sz="1400" dirty="0"/>
+          </a:p>
+          <a:p>
+            <a:pPr lvl="1"/>
+            <a:r>
+              <a:rPr lang="en-US" altLang="ko-KR" sz="1400" dirty="0"/>
+              <a:t>ALTER TABLE REGISTER</a:t>
+            </a:r>
+          </a:p>
+          <a:p>
+            <a:pPr lvl="1"/>
+            <a:r>
+              <a:rPr lang="en-US" altLang="ko-KR" sz="1400" dirty="0"/>
+              <a:t>ADD</a:t>
+            </a:r>
+          </a:p>
+          <a:p>
+            <a:pPr lvl="1"/>
+            <a:r>
+              <a:rPr lang="en-US" altLang="ko-KR" sz="1400" dirty="0"/>
+              <a:t>CONSTRAINT GENDER_CK_CHECK CHECK (GENDER IN ('MALE','FEMALE'))</a:t>
+            </a:r>
+            <a:endParaRPr lang="ko-KR" altLang="en-US" sz="1400" dirty="0"/>
+          </a:p>
+        </p:txBody>
+      </p:sp>
+    </p:spTree>
+    <p:extLst>
+      <p:ext uri="{BB962C8B-B14F-4D97-AF65-F5344CB8AC3E}">
+        <p14:creationId xmlns:p14="http://schemas.microsoft.com/office/powerpoint/2010/main" val="4106981109"/>
+      </p:ext>
+    </p:extLst>
+  </p:cSld>
+  <p:clrMapOvr>
+    <a:masterClrMapping/>
+  </p:clrMapOvr>
+</p:sld>
+</file>
+
+<file path=ppt/slides/slide8.xml><?xml version="1.0" encoding="utf-8"?>
+<p:sld xmlns:a="http://schemas.openxmlformats.org/drawingml/2006/main" xmlns:r="http://schemas.openxmlformats.org/officeDocument/2006/relationships" xmlns:p="http://schemas.openxmlformats.org/presentationml/2006/main">
+  <p:cSld>
+    <p:spTree>
+      <p:nvGrpSpPr>
+        <p:cNvPr id="1" name=""/>
+        <p:cNvGrpSpPr/>
+        <p:nvPr/>
+      </p:nvGrpSpPr>
+      <p:grpSpPr>
+        <a:xfrm>
+          <a:off x="0" y="0"/>
+          <a:ext cx="0" cy="0"/>
+          <a:chOff x="0" y="0"/>
+          <a:chExt cx="0" cy="0"/>
+        </a:xfrm>
+      </p:grpSpPr>
+      <p:sp>
+        <p:nvSpPr>
+          <p:cNvPr id="30" name="직사각형 29"/>
+          <p:cNvSpPr/>
+          <p:nvPr/>
+        </p:nvSpPr>
+        <p:spPr>
+          <a:xfrm>
+            <a:off x="251520" y="980728"/>
+            <a:ext cx="4572000" cy="3323987"/>
+          </a:xfrm>
+          <a:prstGeom prst="rect">
+            <a:avLst/>
+          </a:prstGeom>
+        </p:spPr>
+        <p:txBody>
+          <a:bodyPr>
+            <a:spAutoFit/>
+          </a:bodyPr>
+          <a:lstStyle/>
+          <a:p>
+            <a:pPr marL="285750" indent="-285750">
+              <a:buFont typeface="Arial" pitchFamily="34" charset="0"/>
+              <a:buChar char="•"/>
+            </a:pPr>
+            <a:r>
+              <a:rPr lang="ko-KR" altLang="en-US" sz="1400" b="1" dirty="0" smtClean="0"/>
+              <a:t>계좌관리</a:t>
+            </a:r>
+            <a:endParaRPr lang="en-US" altLang="ko-KR" sz="1400" b="1" dirty="0" smtClean="0"/>
+          </a:p>
+          <a:p>
+            <a:pPr marL="742950" lvl="1" indent="-285750">
+              <a:buFont typeface="Arial" pitchFamily="34" charset="0"/>
+              <a:buChar char="•"/>
+            </a:pPr>
+            <a:endParaRPr lang="en-US" altLang="ko-KR" sz="1400" b="1" dirty="0" smtClean="0"/>
+          </a:p>
+          <a:p>
+            <a:pPr lvl="1"/>
+            <a:r>
+              <a:rPr lang="en-US" altLang="ko-KR" sz="1400" dirty="0" smtClean="0"/>
+              <a:t>CREATE </a:t>
+            </a:r>
+            <a:r>
+              <a:rPr lang="en-US" altLang="ko-KR" sz="1400" dirty="0"/>
+              <a:t>TABLE ACCOUNTMGR</a:t>
+            </a:r>
+          </a:p>
+          <a:p>
+            <a:pPr lvl="1"/>
+            <a:r>
+              <a:rPr lang="en-US" altLang="ko-KR" sz="1400" dirty="0"/>
+              <a:t>(</a:t>
+            </a:r>
+          </a:p>
+          <a:p>
+            <a:pPr lvl="1"/>
+            <a:r>
+              <a:rPr lang="en-US" altLang="ko-KR" sz="1400" dirty="0"/>
+              <a:t>ACCOUNTNO NUMBER,</a:t>
+            </a:r>
+          </a:p>
+          <a:p>
+            <a:pPr lvl="1"/>
+            <a:r>
+              <a:rPr lang="en-US" altLang="ko-KR" sz="1400" dirty="0"/>
+              <a:t>ACCOUNT VARCHAR2(20),</a:t>
+            </a:r>
+          </a:p>
+          <a:p>
+            <a:pPr lvl="1"/>
+            <a:r>
+              <a:rPr lang="en-US" altLang="ko-KR" sz="1400" dirty="0"/>
+              <a:t>ACCTYPE VARCHAR2(20),</a:t>
+            </a:r>
+          </a:p>
+          <a:p>
+            <a:pPr lvl="1"/>
+            <a:r>
+              <a:rPr lang="en-US" altLang="ko-KR" sz="1400" dirty="0"/>
+              <a:t>INTEREST NUMBER,</a:t>
+            </a:r>
+          </a:p>
+          <a:p>
+            <a:pPr lvl="1"/>
+            <a:r>
+              <a:rPr lang="en-US" altLang="ko-KR" sz="1400" dirty="0"/>
+              <a:t>BALANCE NUMBER,</a:t>
+            </a:r>
+          </a:p>
+          <a:p>
+            <a:pPr lvl="1"/>
+            <a:r>
+              <a:rPr lang="en-US" altLang="ko-KR" sz="1400" dirty="0"/>
+              <a:t>USER_NO NUMBER,</a:t>
+            </a:r>
+          </a:p>
+          <a:p>
+            <a:pPr lvl="1"/>
+            <a:r>
+              <a:rPr lang="en-US" altLang="ko-KR" sz="1400" dirty="0"/>
+              <a:t>USAGE VARCHAR2(5),</a:t>
+            </a:r>
+          </a:p>
+          <a:p>
+            <a:pPr lvl="1"/>
+            <a:r>
+              <a:rPr lang="en-US" altLang="ko-KR" sz="1400" dirty="0"/>
+              <a:t>PRIMARY KEY(ACCOUNTNO)</a:t>
+            </a:r>
+          </a:p>
+          <a:p>
+            <a:pPr lvl="1"/>
+            <a:r>
+              <a:rPr lang="en-US" altLang="ko-KR" sz="1400" dirty="0" smtClean="0"/>
+              <a:t>)</a:t>
+            </a:r>
+          </a:p>
+          <a:p>
+            <a:pPr lvl="1"/>
+            <a:endParaRPr lang="en-US" altLang="ko-KR" sz="1400" dirty="0"/>
+          </a:p>
+          <a:p>
+            <a:pPr lvl="1"/>
+            <a:endParaRPr lang="ko-KR" altLang="en-US" sz="1400" dirty="0"/>
+          </a:p>
+        </p:txBody>
+      </p:sp>
+      <p:sp>
+        <p:nvSpPr>
+          <p:cNvPr id="2" name="텍스트 개체 틀 1"/>
+          <p:cNvSpPr>
+            <a:spLocks noGrp="1"/>
+          </p:cNvSpPr>
+          <p:nvPr>
+            <p:ph type="body" sz="quarter" idx="10"/>
+          </p:nvPr>
+        </p:nvSpPr>
+        <p:spPr/>
+        <p:txBody>
+          <a:bodyPr/>
+          <a:lstStyle/>
+          <a:p>
+            <a:pPr>
+              <a:buFont typeface="+mj-lt"/>
+              <a:buAutoNum type="arabicPeriod" startAt="3"/>
+            </a:pPr>
+            <a:r>
+              <a:rPr lang="en-US" altLang="ko-KR" dirty="0" smtClean="0"/>
+              <a:t>DB </a:t>
+            </a:r>
+            <a:r>
+              <a:rPr lang="ko-KR" altLang="en-US" dirty="0" smtClean="0"/>
+              <a:t>구성 </a:t>
+            </a:r>
+            <a:r>
+              <a:rPr lang="en-US" altLang="ko-KR" dirty="0"/>
+              <a:t>- ACCOUNTMGR</a:t>
+            </a:r>
+            <a:endParaRPr lang="ko-KR" altLang="en-US" dirty="0"/>
+          </a:p>
+        </p:txBody>
+      </p:sp>
+      <p:sp>
+        <p:nvSpPr>
+          <p:cNvPr id="9" name="직사각형 8"/>
+          <p:cNvSpPr/>
+          <p:nvPr/>
+        </p:nvSpPr>
+        <p:spPr>
+          <a:xfrm>
+            <a:off x="4572000" y="980728"/>
+            <a:ext cx="4572000" cy="3970318"/>
+          </a:xfrm>
+          <a:prstGeom prst="rect">
+            <a:avLst/>
+          </a:prstGeom>
+        </p:spPr>
+        <p:txBody>
+          <a:bodyPr>
+            <a:spAutoFit/>
+          </a:bodyPr>
+          <a:lstStyle/>
+          <a:p>
+            <a:pPr marL="285750" indent="-285750">
+              <a:buFont typeface="Arial" pitchFamily="34" charset="0"/>
+              <a:buChar char="•"/>
+            </a:pPr>
+            <a:r>
+              <a:rPr lang="ko-KR" altLang="en-US" sz="1400" b="1" dirty="0"/>
+              <a:t>제약조건 추가</a:t>
+            </a:r>
+            <a:endParaRPr lang="en-US" altLang="ko-KR" sz="1400" b="1" dirty="0"/>
+          </a:p>
+          <a:p>
+            <a:endParaRPr lang="en-US" altLang="ko-KR" sz="1400" dirty="0"/>
+          </a:p>
+          <a:p>
+            <a:pPr lvl="1"/>
+            <a:r>
+              <a:rPr lang="en-US" altLang="ko-KR" sz="1400" dirty="0" smtClean="0"/>
+              <a:t>ALTER </a:t>
+            </a:r>
+            <a:r>
+              <a:rPr lang="en-US" altLang="ko-KR" sz="1400" dirty="0"/>
+              <a:t>TABLE ACCOUNTMGR</a:t>
+            </a:r>
+          </a:p>
+          <a:p>
+            <a:pPr lvl="1"/>
+            <a:r>
+              <a:rPr lang="en-US" altLang="ko-KR" sz="1400" dirty="0"/>
+              <a:t>ADD</a:t>
+            </a:r>
+          </a:p>
+          <a:p>
+            <a:pPr lvl="1"/>
+            <a:r>
+              <a:rPr lang="en-US" altLang="ko-KR" sz="1400" dirty="0"/>
+              <a:t>CONSTRAINT USER_NO </a:t>
+            </a:r>
+            <a:r>
+              <a:rPr lang="en-US" altLang="ko-KR" sz="1400" dirty="0" smtClean="0"/>
+              <a:t>_</a:t>
+            </a:r>
+            <a:r>
+              <a:rPr lang="en-US" altLang="ko-KR" sz="1400" dirty="0"/>
+              <a:t>FK FOREIGN </a:t>
+            </a:r>
+            <a:r>
+              <a:rPr lang="en-US" altLang="ko-KR" sz="1400" dirty="0" smtClean="0"/>
+              <a:t>KEY(</a:t>
+            </a:r>
+            <a:r>
+              <a:rPr lang="en-US" altLang="ko-KR" sz="1400" dirty="0"/>
+              <a:t>USER_NO</a:t>
+            </a:r>
+            <a:r>
+              <a:rPr lang="en-US" altLang="ko-KR" sz="1400" dirty="0" smtClean="0"/>
+              <a:t>) </a:t>
+            </a:r>
+            <a:r>
+              <a:rPr lang="en-US" altLang="ko-KR" sz="1400" dirty="0"/>
+              <a:t>REFERENCES </a:t>
+            </a:r>
+            <a:r>
+              <a:rPr lang="en-US" altLang="ko-KR" sz="1400" dirty="0" smtClean="0"/>
+              <a:t>REGISTER(</a:t>
+            </a:r>
+            <a:r>
+              <a:rPr lang="en-US" altLang="ko-KR" sz="1400" dirty="0"/>
+              <a:t>USER_NO</a:t>
+            </a:r>
+            <a:r>
+              <a:rPr lang="en-US" altLang="ko-KR" sz="1400" dirty="0" smtClean="0"/>
+              <a:t>)</a:t>
+            </a:r>
+            <a:endParaRPr lang="en-US" altLang="ko-KR" sz="1400" dirty="0"/>
+          </a:p>
+          <a:p>
+            <a:pPr lvl="1"/>
+            <a:endParaRPr lang="ko-KR" altLang="en-US" sz="1400" dirty="0" smtClean="0"/>
+          </a:p>
+          <a:p>
+            <a:pPr lvl="1"/>
+            <a:r>
+              <a:rPr lang="en-US" altLang="ko-KR" sz="1400" dirty="0" smtClean="0"/>
+              <a:t>ALTER TABLE ACCOUNTMGR</a:t>
+            </a:r>
+          </a:p>
+          <a:p>
+            <a:pPr lvl="1"/>
+            <a:r>
+              <a:rPr lang="en-US" altLang="ko-KR" sz="1400" dirty="0" smtClean="0"/>
+              <a:t>ADD</a:t>
+            </a:r>
+          </a:p>
+          <a:p>
+            <a:pPr lvl="1"/>
+            <a:r>
+              <a:rPr lang="en-US" altLang="ko-KR" sz="1400" dirty="0" smtClean="0"/>
+              <a:t>CONSTRAINT </a:t>
+            </a:r>
+            <a:r>
+              <a:rPr lang="en-US" altLang="ko-KR" sz="1400" dirty="0"/>
+              <a:t>USAGE_CK_CHECK CHECK (USAGE IN ('TRUE','FALSE'))</a:t>
+            </a:r>
+          </a:p>
+          <a:p>
+            <a:pPr lvl="1"/>
+            <a:endParaRPr lang="ko-KR" altLang="en-US" sz="1400" dirty="0" smtClean="0"/>
+          </a:p>
+          <a:p>
+            <a:pPr lvl="1"/>
+            <a:r>
+              <a:rPr lang="en-US" altLang="ko-KR" sz="1400" dirty="0" smtClean="0"/>
+              <a:t>ALTER TABLE ACCOUNTMGR</a:t>
+            </a:r>
+          </a:p>
+          <a:p>
+            <a:pPr lvl="1"/>
+            <a:r>
+              <a:rPr lang="en-US" altLang="ko-KR" sz="1400" dirty="0" smtClean="0"/>
+              <a:t>ADD</a:t>
+            </a:r>
+          </a:p>
+          <a:p>
+            <a:pPr lvl="1"/>
+            <a:r>
+              <a:rPr lang="en-US" altLang="ko-KR" sz="1400" dirty="0" smtClean="0"/>
+              <a:t>CONSTRAINT </a:t>
+            </a:r>
+            <a:r>
+              <a:rPr lang="en-US" altLang="ko-KR" sz="1400" dirty="0"/>
+              <a:t>ACCTYPE_CK_CHECK CHECK (ACCTYPE IN ('CREDIT','CASH','ACC', 'STOCK', 'DEBIT'))</a:t>
+            </a:r>
+          </a:p>
+          <a:p>
+            <a:pPr lvl="1"/>
+            <a:endParaRPr lang="ko-KR" altLang="en-US" sz="1400" dirty="0"/>
+          </a:p>
+        </p:txBody>
+      </p:sp>
+    </p:spTree>
+    <p:extLst>
+      <p:ext uri="{BB962C8B-B14F-4D97-AF65-F5344CB8AC3E}">
+        <p14:creationId xmlns:p14="http://schemas.microsoft.com/office/powerpoint/2010/main" val="3474149023"/>
+      </p:ext>
+    </p:extLst>
+  </p:cSld>
+  <p:clrMapOvr>
+    <a:masterClrMapping/>
+  </p:clrMapOvr>
+</p:sld>
+</file>
+
+<file path=ppt/slides/slide9.xml><?xml version="1.0" encoding="utf-8"?>
+<p:sld xmlns:a="http://schemas.openxmlformats.org/drawingml/2006/main" xmlns:r="http://schemas.openxmlformats.org/officeDocument/2006/relationships" xmlns:p="http://schemas.openxmlformats.org/presentationml/2006/main">
+  <p:cSld>
+    <p:spTree>
+      <p:nvGrpSpPr>
+        <p:cNvPr id="1" name=""/>
+        <p:cNvGrpSpPr/>
+        <p:nvPr/>
+      </p:nvGrpSpPr>
+      <p:grpSpPr>
+        <a:xfrm>
+          <a:off x="0" y="0"/>
+          <a:ext cx="0" cy="0"/>
+          <a:chOff x="0" y="0"/>
+          <a:chExt cx="0" cy="0"/>
+        </a:xfrm>
+      </p:grpSpPr>
+      <p:sp>
+        <p:nvSpPr>
+          <p:cNvPr id="2" name="텍스트 개체 틀 1"/>
+          <p:cNvSpPr>
+            <a:spLocks noGrp="1"/>
+          </p:cNvSpPr>
+          <p:nvPr>
+            <p:ph type="body" sz="quarter" idx="10"/>
+          </p:nvPr>
+        </p:nvSpPr>
+        <p:spPr/>
+        <p:txBody>
+          <a:bodyPr/>
+          <a:lstStyle/>
+          <a:p>
+            <a:pPr>
+              <a:buFont typeface="+mj-lt"/>
+              <a:buAutoNum type="arabicPeriod" startAt="3"/>
+            </a:pPr>
+            <a:r>
+              <a:rPr lang="en-US" altLang="ko-KR" dirty="0" smtClean="0"/>
+              <a:t>DB </a:t>
+            </a:r>
+            <a:r>
+              <a:rPr lang="ko-KR" altLang="en-US" dirty="0" smtClean="0"/>
+              <a:t>구성 </a:t>
+            </a:r>
+            <a:r>
+              <a:rPr lang="en-US" altLang="ko-KR" dirty="0"/>
+              <a:t>- INCOME</a:t>
+            </a:r>
+            <a:endParaRPr lang="ko-KR" altLang="en-US" dirty="0"/>
+          </a:p>
+        </p:txBody>
+      </p:sp>
+      <p:sp>
+        <p:nvSpPr>
+          <p:cNvPr id="16" name="직사각형 15"/>
+          <p:cNvSpPr/>
+          <p:nvPr/>
+        </p:nvSpPr>
+        <p:spPr>
+          <a:xfrm>
+            <a:off x="251520" y="980728"/>
+            <a:ext cx="4572000" cy="2893100"/>
+          </a:xfrm>
+          <a:prstGeom prst="rect">
+            <a:avLst/>
+          </a:prstGeom>
+        </p:spPr>
+        <p:txBody>
+          <a:bodyPr>
+            <a:spAutoFit/>
+          </a:bodyPr>
+          <a:lstStyle/>
+          <a:p>
+            <a:pPr marL="285750" indent="-285750">
+              <a:buFont typeface="Arial" pitchFamily="34" charset="0"/>
+              <a:buChar char="•"/>
+            </a:pPr>
+            <a:r>
+              <a:rPr lang="ko-KR" altLang="en-US" sz="1400" b="1" dirty="0" smtClean="0"/>
+              <a:t>수입관리</a:t>
+            </a:r>
+            <a:endParaRPr lang="en-US" altLang="ko-KR" sz="1400" b="1" dirty="0"/>
+          </a:p>
+          <a:p>
+            <a:endParaRPr lang="en-US" altLang="ko-KR" sz="1400" b="1" dirty="0" smtClean="0"/>
+          </a:p>
+          <a:p>
+            <a:pPr lvl="1"/>
+            <a:r>
+              <a:rPr lang="en-US" altLang="ko-KR" sz="1400" dirty="0"/>
+              <a:t>CREATE TABLE INCOME</a:t>
+            </a:r>
+          </a:p>
+          <a:p>
+            <a:pPr lvl="1"/>
+            <a:r>
+              <a:rPr lang="en-US" altLang="ko-KR" sz="1400" dirty="0"/>
+              <a:t>(</a:t>
+            </a:r>
+          </a:p>
+          <a:p>
+            <a:pPr lvl="1"/>
+            <a:r>
+              <a:rPr lang="en-US" altLang="ko-KR" sz="1400" dirty="0"/>
+              <a:t>INC_SQ NUMBER,</a:t>
+            </a:r>
+          </a:p>
+          <a:p>
+            <a:pPr lvl="1"/>
+            <a:r>
+              <a:rPr lang="en-US" altLang="ko-KR" sz="1400" dirty="0"/>
+              <a:t>USER_NO NUMBER,</a:t>
+            </a:r>
+          </a:p>
+          <a:p>
+            <a:pPr lvl="1"/>
+            <a:r>
+              <a:rPr lang="en-US" altLang="ko-KR" sz="1400" dirty="0"/>
+              <a:t>AMOUNTS NUMBER,</a:t>
+            </a:r>
+          </a:p>
+          <a:p>
+            <a:pPr lvl="1"/>
+            <a:r>
+              <a:rPr lang="en-US" altLang="ko-KR" sz="1400" dirty="0"/>
+              <a:t>MEMO VARCHAR2(50),</a:t>
+            </a:r>
+          </a:p>
+          <a:p>
+            <a:pPr lvl="1"/>
+            <a:r>
+              <a:rPr lang="en-US" altLang="ko-KR" sz="1400" dirty="0"/>
+              <a:t>INC_DATE DATE,</a:t>
+            </a:r>
+          </a:p>
+          <a:p>
+            <a:pPr lvl="1"/>
+            <a:r>
+              <a:rPr lang="en-US" altLang="ko-KR" sz="1400" dirty="0"/>
+              <a:t>ACCOUNTNO NUMBER,</a:t>
+            </a:r>
+          </a:p>
+          <a:p>
+            <a:pPr lvl="1"/>
+            <a:r>
+              <a:rPr lang="en-US" altLang="ko-KR" sz="1400" dirty="0"/>
+              <a:t>CATEGORYNO NUMBER,</a:t>
+            </a:r>
+          </a:p>
+          <a:p>
+            <a:pPr lvl="1"/>
+            <a:r>
+              <a:rPr lang="en-US" altLang="ko-KR" sz="1400" dirty="0"/>
+              <a:t>PRIMARY KEY(USER_NO)</a:t>
+            </a:r>
+          </a:p>
+          <a:p>
+            <a:pPr lvl="1"/>
+            <a:r>
+              <a:rPr lang="en-US" altLang="ko-KR" sz="1400" dirty="0"/>
+              <a:t>)</a:t>
+            </a:r>
+            <a:endParaRPr lang="ko-KR" altLang="en-US" sz="1400" dirty="0"/>
+          </a:p>
+        </p:txBody>
+      </p:sp>
+      <p:sp>
+        <p:nvSpPr>
+          <p:cNvPr id="8" name="직사각형 7"/>
+          <p:cNvSpPr/>
+          <p:nvPr/>
+        </p:nvSpPr>
+        <p:spPr>
+          <a:xfrm>
+            <a:off x="4572000" y="980728"/>
+            <a:ext cx="4572000" cy="4585871"/>
+          </a:xfrm>
+          <a:prstGeom prst="rect">
+            <a:avLst/>
+          </a:prstGeom>
+        </p:spPr>
+        <p:txBody>
+          <a:bodyPr>
+            <a:spAutoFit/>
+          </a:bodyPr>
+          <a:lstStyle/>
+          <a:p>
+            <a:pPr marL="285750" indent="-285750">
+              <a:buFont typeface="Arial" pitchFamily="34" charset="0"/>
+              <a:buChar char="•"/>
+            </a:pPr>
+            <a:r>
+              <a:rPr lang="ko-KR" altLang="en-US" sz="1400" b="1" dirty="0"/>
+              <a:t>제약조건 추가</a:t>
+            </a:r>
+            <a:endParaRPr lang="en-US" altLang="ko-KR" sz="1400" b="1" dirty="0"/>
+          </a:p>
+          <a:p>
+            <a:endParaRPr lang="en-US" altLang="ko-KR" sz="1400" dirty="0"/>
+          </a:p>
+          <a:p>
+            <a:pPr lvl="1"/>
+            <a:r>
+              <a:rPr lang="en-US" altLang="ko-KR" sz="1400" dirty="0"/>
+              <a:t>ALTER TABLE INCOME</a:t>
+            </a:r>
+          </a:p>
+          <a:p>
+            <a:pPr lvl="1"/>
+            <a:r>
+              <a:rPr lang="en-US" altLang="ko-KR" sz="1400" dirty="0"/>
+              <a:t>ADD</a:t>
+            </a:r>
+          </a:p>
+          <a:p>
+            <a:pPr lvl="1"/>
+            <a:r>
+              <a:rPr lang="en-US" altLang="ko-KR" sz="1400" dirty="0"/>
+              <a:t>CONSTRAINT USRNO_INC_FK FOREIGN KEY(USER_NO) REFERENCES REGISTER(USER_NO)</a:t>
+            </a:r>
+          </a:p>
+          <a:p>
+            <a:pPr lvl="1"/>
+            <a:endParaRPr lang="en-US" altLang="ko-KR" sz="1400" dirty="0"/>
+          </a:p>
+          <a:p>
+            <a:pPr lvl="1"/>
+            <a:r>
+              <a:rPr lang="en-US" altLang="ko-KR" sz="1400" dirty="0"/>
+              <a:t>ALTER TABLE INCOME</a:t>
+            </a:r>
+          </a:p>
+          <a:p>
+            <a:pPr lvl="1"/>
+            <a:r>
+              <a:rPr lang="en-US" altLang="ko-KR" sz="1400" dirty="0"/>
+              <a:t>ADD</a:t>
+            </a:r>
+          </a:p>
+          <a:p>
+            <a:pPr lvl="1"/>
+            <a:r>
+              <a:rPr lang="en-US" altLang="ko-KR" sz="1400" dirty="0"/>
+              <a:t>CONSTRAINT ACTNO_FK FOREIGN KEY(ACCOUNTNO) REFERENCES ACCOUNTMGR(ACCOUNTNO)</a:t>
+            </a:r>
+          </a:p>
+          <a:p>
+            <a:pPr lvl="1"/>
+            <a:endParaRPr lang="en-US" altLang="ko-KR" sz="1400" dirty="0"/>
+          </a:p>
+          <a:p>
+            <a:pPr lvl="1"/>
+            <a:r>
+              <a:rPr lang="en-US" altLang="ko-KR" sz="1400" dirty="0"/>
+              <a:t>ALTER TABLE INCOME</a:t>
+            </a:r>
+          </a:p>
+          <a:p>
+            <a:pPr lvl="1"/>
+            <a:r>
+              <a:rPr lang="en-US" altLang="ko-KR" sz="1400" dirty="0"/>
+              <a:t>ADD</a:t>
+            </a:r>
+          </a:p>
+          <a:p>
+            <a:pPr lvl="1"/>
+            <a:r>
+              <a:rPr lang="en-US" altLang="ko-KR" sz="1400" dirty="0"/>
+              <a:t>CONSTRAINT CATNO_INC_FK FOREIGN KEY(CATEGORYNO) REFERENCES CATEGORYMGR(CATEGORYNO)</a:t>
+            </a:r>
+          </a:p>
+          <a:p>
+            <a:pPr lvl="1"/>
+            <a:endParaRPr lang="en-US" altLang="ko-KR" dirty="0"/>
+          </a:p>
+          <a:p>
+            <a:pPr lvl="1"/>
+            <a:endParaRPr lang="en-US" altLang="ko-KR" dirty="0"/>
+          </a:p>
+        </p:txBody>
+      </p:sp>
+    </p:spTree>
+    <p:extLst>
+      <p:ext uri="{BB962C8B-B14F-4D97-AF65-F5344CB8AC3E}">
+        <p14:creationId xmlns:p14="http://schemas.microsoft.com/office/powerpoint/2010/main" val="3474149023"/>
       </p:ext>
     </p:extLst>
   </p:cSld>

</xml_diff>